<commit_message>
PPT of C3-C5 优化 by 李新
</commit_message>
<xml_diff>
--- a/课程/第4章 自动追踪小车大白/第1节 环境准备-借我一双慧眼/第1节-教学PPT.pptx
+++ b/课程/第4章 自动追踪小车大白/第1节 环境准备-借我一双慧眼/第1节-教学PPT.pptx
@@ -5,7 +5,7 @@
     <p:sldMasterId id="2147483660" r:id="rId1"/>
   </p:sldMasterIdLst>
   <p:notesMasterIdLst>
-    <p:notesMasterId r:id="rId14"/>
+    <p:notesMasterId r:id="rId15"/>
   </p:notesMasterIdLst>
   <p:sldIdLst>
     <p:sldId id="337" r:id="rId2"/>
@@ -16,15 +16,16 @@
     <p:sldId id="11456" r:id="rId7"/>
     <p:sldId id="339" r:id="rId8"/>
     <p:sldId id="11458" r:id="rId9"/>
-    <p:sldId id="342" r:id="rId10"/>
-    <p:sldId id="11454" r:id="rId11"/>
-    <p:sldId id="11439" r:id="rId12"/>
-    <p:sldId id="11428" r:id="rId13"/>
+    <p:sldId id="340" r:id="rId10"/>
+    <p:sldId id="342" r:id="rId11"/>
+    <p:sldId id="11454" r:id="rId12"/>
+    <p:sldId id="11439" r:id="rId13"/>
+    <p:sldId id="11428" r:id="rId14"/>
   </p:sldIdLst>
   <p:sldSz cx="12192000" cy="6858000"/>
   <p:notesSz cx="6858000" cy="9144000"/>
   <p:custDataLst>
-    <p:tags r:id="rId15"/>
+    <p:tags r:id="rId16"/>
   </p:custDataLst>
   <p:defaultTextStyle>
     <a:defPPr>
@@ -3407,7 +3408,7 @@
           <a:p>
             <a:fld id="{F758C255-79C3-45A8-945E-2C61C3C6BAA9}" type="datetimeFigureOut">
               <a:rPr lang="zh-CN" altLang="en-US" smtClean="0"/>
-              <a:t>2019/8/20</a:t>
+              <a:t>2019/11/25</a:t>
             </a:fld>
             <a:endParaRPr lang="zh-CN" altLang="en-US"/>
           </a:p>
@@ -3802,7 +3803,7 @@
           <a:bodyPr/>
           <a:lstStyle/>
           <a:p>
-            <a:endParaRPr lang="zh-CN" altLang="en-US"/>
+            <a:endParaRPr lang="zh-CN" altLang="en-US" dirty="0"/>
           </a:p>
         </p:txBody>
       </p:sp>
@@ -3832,7 +3833,7 @@
     </p:spTree>
     <p:extLst>
       <p:ext uri="{BB962C8B-B14F-4D97-AF65-F5344CB8AC3E}">
-        <p14:creationId xmlns:p14="http://schemas.microsoft.com/office/powerpoint/2010/main" val="1253508485"/>
+        <p14:creationId xmlns:p14="http://schemas.microsoft.com/office/powerpoint/2010/main" val="4015588832"/>
       </p:ext>
     </p:extLst>
   </p:cSld>
@@ -3916,7 +3917,7 @@
     </p:spTree>
     <p:extLst>
       <p:ext uri="{BB962C8B-B14F-4D97-AF65-F5344CB8AC3E}">
-        <p14:creationId xmlns:p14="http://schemas.microsoft.com/office/powerpoint/2010/main" val="3461049005"/>
+        <p14:creationId xmlns:p14="http://schemas.microsoft.com/office/powerpoint/2010/main" val="1253508485"/>
       </p:ext>
     </p:extLst>
   </p:cSld>
@@ -3981,6 +3982,90 @@
             <a:spLocks noGrp="1"/>
           </p:cNvSpPr>
           <p:nvPr>
+            <p:ph type="sldNum" sz="quarter" idx="10"/>
+          </p:nvPr>
+        </p:nvSpPr>
+        <p:spPr/>
+        <p:txBody>
+          <a:bodyPr/>
+          <a:lstStyle/>
+          <a:p>
+            <a:fld id="{C8679852-FE9E-45B5-93CD-6D9F89316D6C}" type="slidenum">
+              <a:rPr lang="zh-CN" altLang="en-US" smtClean="0"/>
+              <a:t>12</a:t>
+            </a:fld>
+            <a:endParaRPr lang="zh-CN" altLang="en-US"/>
+          </a:p>
+        </p:txBody>
+      </p:sp>
+    </p:spTree>
+    <p:extLst>
+      <p:ext uri="{BB962C8B-B14F-4D97-AF65-F5344CB8AC3E}">
+        <p14:creationId xmlns:p14="http://schemas.microsoft.com/office/powerpoint/2010/main" val="3461049005"/>
+      </p:ext>
+    </p:extLst>
+  </p:cSld>
+  <p:clrMapOvr>
+    <a:masterClrMapping/>
+  </p:clrMapOvr>
+</p:notes>
+</file>
+
+<file path=ppt/notesSlides/notesSlide13.xml><?xml version="1.0" encoding="utf-8"?>
+<p:notes xmlns:a="http://schemas.openxmlformats.org/drawingml/2006/main" xmlns:r="http://schemas.openxmlformats.org/officeDocument/2006/relationships" xmlns:p="http://schemas.openxmlformats.org/presentationml/2006/main">
+  <p:cSld>
+    <p:spTree>
+      <p:nvGrpSpPr>
+        <p:cNvPr id="1" name=""/>
+        <p:cNvGrpSpPr/>
+        <p:nvPr/>
+      </p:nvGrpSpPr>
+      <p:grpSpPr>
+        <a:xfrm>
+          <a:off x="0" y="0"/>
+          <a:ext cx="0" cy="0"/>
+          <a:chOff x="0" y="0"/>
+          <a:chExt cx="0" cy="0"/>
+        </a:xfrm>
+      </p:grpSpPr>
+      <p:sp>
+        <p:nvSpPr>
+          <p:cNvPr id="2" name="幻灯片图像占位符 1"/>
+          <p:cNvSpPr>
+            <a:spLocks noGrp="1" noRot="1" noChangeAspect="1"/>
+          </p:cNvSpPr>
+          <p:nvPr>
+            <p:ph type="sldImg"/>
+          </p:nvPr>
+        </p:nvSpPr>
+        <p:spPr/>
+      </p:sp>
+      <p:sp>
+        <p:nvSpPr>
+          <p:cNvPr id="3" name="备注占位符 2"/>
+          <p:cNvSpPr>
+            <a:spLocks noGrp="1"/>
+          </p:cNvSpPr>
+          <p:nvPr>
+            <p:ph type="body" idx="1"/>
+          </p:nvPr>
+        </p:nvSpPr>
+        <p:spPr/>
+        <p:txBody>
+          <a:bodyPr/>
+          <a:lstStyle/>
+          <a:p>
+            <a:endParaRPr lang="zh-CN" altLang="en-US"/>
+          </a:p>
+        </p:txBody>
+      </p:sp>
+      <p:sp>
+        <p:nvSpPr>
+          <p:cNvPr id="4" name="灯片编号占位符 3"/>
+          <p:cNvSpPr>
+            <a:spLocks noGrp="1"/>
+          </p:cNvSpPr>
+          <p:nvPr>
             <p:ph type="sldNum" sz="quarter" idx="5"/>
           </p:nvPr>
         </p:nvSpPr>
@@ -3991,7 +4076,7 @@
           <a:p>
             <a:fld id="{64E61829-E50B-4091-AE21-893680968DF2}" type="slidenum">
               <a:rPr lang="zh-CN" altLang="en-US" smtClean="0"/>
-              <a:t>12</a:t>
+              <a:t>13</a:t>
             </a:fld>
             <a:endParaRPr lang="zh-CN" altLang="en-US"/>
           </a:p>
@@ -4642,7 +4727,7 @@
           <a:bodyPr/>
           <a:lstStyle/>
           <a:p>
-            <a:endParaRPr lang="zh-CN" altLang="en-US" dirty="0"/>
+            <a:endParaRPr lang="zh-CN" altLang="en-US"/>
           </a:p>
         </p:txBody>
       </p:sp>
@@ -4672,7 +4757,7 @@
     </p:spTree>
     <p:extLst>
       <p:ext uri="{BB962C8B-B14F-4D97-AF65-F5344CB8AC3E}">
-        <p14:creationId xmlns:p14="http://schemas.microsoft.com/office/powerpoint/2010/main" val="4015588832"/>
+        <p14:creationId xmlns:p14="http://schemas.microsoft.com/office/powerpoint/2010/main" val="32918777"/>
       </p:ext>
     </p:extLst>
   </p:cSld>
@@ -5464,7 +5549,7 @@
           <a:p>
             <a:fld id="{276664BA-FAEB-42F3-A8BE-09D6F18B1435}" type="datetimeFigureOut">
               <a:rPr lang="zh-CN" altLang="en-US" smtClean="0"/>
-              <a:t>2019/8/20</a:t>
+              <a:t>2019/11/25</a:t>
             </a:fld>
             <a:endParaRPr lang="zh-CN" altLang="en-US"/>
           </a:p>
@@ -6291,6 +6376,557 @@
 </file>
 
 <file path=ppt/slides/slide10.xml><?xml version="1.0" encoding="utf-8"?>
+<p:sld xmlns:a="http://schemas.openxmlformats.org/drawingml/2006/main" xmlns:r="http://schemas.openxmlformats.org/officeDocument/2006/relationships" xmlns:p="http://schemas.openxmlformats.org/presentationml/2006/main">
+  <p:cSld>
+    <p:spTree>
+      <p:nvGrpSpPr>
+        <p:cNvPr id="1" name=""/>
+        <p:cNvGrpSpPr/>
+        <p:nvPr/>
+      </p:nvGrpSpPr>
+      <p:grpSpPr>
+        <a:xfrm>
+          <a:off x="0" y="0"/>
+          <a:ext cx="0" cy="0"/>
+          <a:chOff x="0" y="0"/>
+          <a:chExt cx="0" cy="0"/>
+        </a:xfrm>
+      </p:grpSpPr>
+      <p:graphicFrame>
+        <p:nvGraphicFramePr>
+          <p:cNvPr id="11" name="Diagram 29">
+            <a:extLst>
+              <a:ext uri="{FF2B5EF4-FFF2-40B4-BE49-F238E27FC236}">
+                <a16:creationId xmlns:a16="http://schemas.microsoft.com/office/drawing/2014/main" id="{A887E04C-D6A6-4060-AB04-9DEA6C415D10}"/>
+              </a:ext>
+            </a:extLst>
+          </p:cNvPr>
+          <p:cNvGraphicFramePr/>
+          <p:nvPr>
+            <p:extLst>
+              <p:ext uri="{D42A27DB-BD31-4B8C-83A1-F6EECF244321}">
+                <p14:modId xmlns:p14="http://schemas.microsoft.com/office/powerpoint/2010/main" val="337982066"/>
+              </p:ext>
+            </p:extLst>
+          </p:nvPr>
+        </p:nvGraphicFramePr>
+        <p:xfrm>
+          <a:off x="803959" y="2748976"/>
+          <a:ext cx="8153537" cy="4528697"/>
+        </p:xfrm>
+        <a:graphic>
+          <a:graphicData uri="http://schemas.openxmlformats.org/drawingml/2006/diagram">
+            <dgm:relIds xmlns:dgm="http://schemas.openxmlformats.org/drawingml/2006/diagram" xmlns:r="http://schemas.openxmlformats.org/officeDocument/2006/relationships" r:dm="rId3" r:lo="rId4" r:qs="rId5" r:cs="rId6"/>
+          </a:graphicData>
+        </a:graphic>
+      </p:graphicFrame>
+      <p:pic>
+        <p:nvPicPr>
+          <p:cNvPr id="13" name="图片 12">
+            <a:extLst>
+              <a:ext uri="{FF2B5EF4-FFF2-40B4-BE49-F238E27FC236}">
+                <a16:creationId xmlns:a16="http://schemas.microsoft.com/office/drawing/2014/main" id="{FC574232-914F-4D39-996B-BD244B17B352}"/>
+              </a:ext>
+            </a:extLst>
+          </p:cNvPr>
+          <p:cNvPicPr>
+            <a:picLocks noChangeAspect="1"/>
+          </p:cNvPicPr>
+          <p:nvPr/>
+        </p:nvPicPr>
+        <p:blipFill>
+          <a:blip r:embed="rId8"/>
+          <a:stretch>
+            <a:fillRect/>
+          </a:stretch>
+        </p:blipFill>
+        <p:spPr>
+          <a:xfrm>
+            <a:off x="3204133" y="5660466"/>
+            <a:ext cx="1619250" cy="1304925"/>
+          </a:xfrm>
+          <a:prstGeom prst="rect">
+            <a:avLst/>
+          </a:prstGeom>
+        </p:spPr>
+      </p:pic>
+      <p:sp>
+        <p:nvSpPr>
+          <p:cNvPr id="66" name="标题 1">
+            <a:extLst>
+              <a:ext uri="{FF2B5EF4-FFF2-40B4-BE49-F238E27FC236}">
+                <a16:creationId xmlns:a16="http://schemas.microsoft.com/office/drawing/2014/main" id="{9D9E66B2-5FDB-4150-9D01-9F8C5F9590AB}"/>
+              </a:ext>
+            </a:extLst>
+          </p:cNvPr>
+          <p:cNvSpPr>
+            <a:spLocks noGrp="1"/>
+          </p:cNvSpPr>
+          <p:nvPr>
+            <p:ph type="title"/>
+          </p:nvPr>
+        </p:nvSpPr>
+        <p:spPr>
+          <a:xfrm>
+            <a:off x="1108759" y="182521"/>
+            <a:ext cx="8128000" cy="474780"/>
+          </a:xfrm>
+        </p:spPr>
+        <p:txBody>
+          <a:bodyPr>
+            <a:noAutofit/>
+          </a:bodyPr>
+          <a:lstStyle/>
+          <a:p>
+            <a:r>
+              <a:rPr lang="zh-CN" altLang="en-US" sz="2800" dirty="0">
+                <a:solidFill>
+                  <a:srgbClr val="2874A9"/>
+                </a:solidFill>
+                <a:latin typeface="微软雅黑" panose="020B0503020204020204" pitchFamily="34" charset="-122"/>
+                <a:ea typeface="微软雅黑" panose="020B0503020204020204" pitchFamily="34" charset="-122"/>
+              </a:rPr>
+              <a:t>需要哪些硬件？</a:t>
+            </a:r>
+          </a:p>
+        </p:txBody>
+      </p:sp>
+      <p:sp>
+        <p:nvSpPr>
+          <p:cNvPr id="4" name="矩形 3">
+            <a:extLst>
+              <a:ext uri="{FF2B5EF4-FFF2-40B4-BE49-F238E27FC236}">
+                <a16:creationId xmlns:a16="http://schemas.microsoft.com/office/drawing/2014/main" id="{E8EA1602-372F-46B0-A3A0-3A00C35C5314}"/>
+              </a:ext>
+            </a:extLst>
+          </p:cNvPr>
+          <p:cNvSpPr/>
+          <p:nvPr/>
+        </p:nvSpPr>
+        <p:spPr>
+          <a:xfrm>
+            <a:off x="803959" y="1061654"/>
+            <a:ext cx="9321117" cy="967957"/>
+          </a:xfrm>
+          <a:prstGeom prst="rect">
+            <a:avLst/>
+          </a:prstGeom>
+        </p:spPr>
+        <p:txBody>
+          <a:bodyPr wrap="square">
+            <a:spAutoFit/>
+          </a:bodyPr>
+          <a:lstStyle/>
+          <a:p>
+            <a:pPr marL="285750" indent="-285750">
+              <a:lnSpc>
+                <a:spcPct val="150000"/>
+              </a:lnSpc>
+              <a:buFont typeface="Wingdings" panose="05000000000000000000" pitchFamily="2" charset="2"/>
+              <a:buChar char="n"/>
+            </a:pPr>
+            <a:r>
+              <a:rPr lang="zh-CN" altLang="en-US" sz="2000" b="1" dirty="0">
+                <a:solidFill>
+                  <a:srgbClr val="EEAF34"/>
+                </a:solidFill>
+              </a:rPr>
+              <a:t>目标：为小白实现视觉模块。</a:t>
+            </a:r>
+            <a:endParaRPr lang="en-US" altLang="zh-CN" sz="2000" b="1" dirty="0">
+              <a:solidFill>
+                <a:srgbClr val="EEAF34"/>
+              </a:solidFill>
+            </a:endParaRPr>
+          </a:p>
+          <a:p>
+            <a:pPr marL="285750" indent="-285750">
+              <a:lnSpc>
+                <a:spcPct val="150000"/>
+              </a:lnSpc>
+              <a:buFont typeface="Wingdings" panose="05000000000000000000" pitchFamily="2" charset="2"/>
+              <a:buChar char="n"/>
+            </a:pPr>
+            <a:r>
+              <a:rPr lang="zh-CN" altLang="en-US" sz="2000" b="1" dirty="0">
+                <a:solidFill>
+                  <a:srgbClr val="1165A0"/>
+                </a:solidFill>
+              </a:rPr>
+              <a:t>请同学们检查一下手里的材料是否齐全？</a:t>
+            </a:r>
+            <a:endParaRPr lang="en-US" altLang="zh-CN" sz="2000" b="1" dirty="0">
+              <a:solidFill>
+                <a:srgbClr val="1165A0"/>
+              </a:solidFill>
+            </a:endParaRPr>
+          </a:p>
+        </p:txBody>
+      </p:sp>
+      <p:sp>
+        <p:nvSpPr>
+          <p:cNvPr id="5" name="等腰三角形 4">
+            <a:extLst>
+              <a:ext uri="{FF2B5EF4-FFF2-40B4-BE49-F238E27FC236}">
+                <a16:creationId xmlns:a16="http://schemas.microsoft.com/office/drawing/2014/main" id="{4BC54AA8-0A19-4174-B334-9AC3C3D51C4E}"/>
+              </a:ext>
+            </a:extLst>
+          </p:cNvPr>
+          <p:cNvSpPr/>
+          <p:nvPr/>
+        </p:nvSpPr>
+        <p:spPr>
+          <a:xfrm>
+            <a:off x="8665547" y="2862704"/>
+            <a:ext cx="321399" cy="321399"/>
+          </a:xfrm>
+          <a:prstGeom prst="triangle">
+            <a:avLst>
+              <a:gd name="adj" fmla="val 100000"/>
+            </a:avLst>
+          </a:prstGeom>
+          <a:solidFill>
+            <a:schemeClr val="accent3"/>
+          </a:solidFill>
+          <a:ln>
+            <a:noFill/>
+          </a:ln>
+        </p:spPr>
+        <p:style>
+          <a:lnRef idx="2">
+            <a:scrgbClr r="0" g="0" b="0"/>
+          </a:lnRef>
+          <a:fillRef idx="1">
+            <a:scrgbClr r="0" g="0" b="0"/>
+          </a:fillRef>
+          <a:effectRef idx="0">
+            <a:schemeClr val="accent2">
+              <a:hueOff val="0"/>
+              <a:satOff val="0"/>
+              <a:lumOff val="0"/>
+              <a:alphaOff val="0"/>
+            </a:schemeClr>
+          </a:effectRef>
+          <a:fontRef idx="minor">
+            <a:schemeClr val="lt1"/>
+          </a:fontRef>
+        </p:style>
+      </p:sp>
+      <p:sp>
+        <p:nvSpPr>
+          <p:cNvPr id="6" name="L 形 5">
+            <a:extLst>
+              <a:ext uri="{FF2B5EF4-FFF2-40B4-BE49-F238E27FC236}">
+                <a16:creationId xmlns:a16="http://schemas.microsoft.com/office/drawing/2014/main" id="{22AE386B-522C-48D2-950C-91FB967AA305}"/>
+              </a:ext>
+            </a:extLst>
+          </p:cNvPr>
+          <p:cNvSpPr/>
+          <p:nvPr/>
+        </p:nvSpPr>
+        <p:spPr>
+          <a:xfrm rot="5400000">
+            <a:off x="9558121" y="2485600"/>
+            <a:ext cx="1133910" cy="1886801"/>
+          </a:xfrm>
+          <a:prstGeom prst="corner">
+            <a:avLst>
+              <a:gd name="adj1" fmla="val 16120"/>
+              <a:gd name="adj2" fmla="val 16110"/>
+            </a:avLst>
+          </a:prstGeom>
+          <a:ln>
+            <a:noFill/>
+          </a:ln>
+        </p:spPr>
+        <p:style>
+          <a:lnRef idx="2">
+            <a:scrgbClr r="0" g="0" b="0"/>
+          </a:lnRef>
+          <a:fillRef idx="1">
+            <a:schemeClr val="accent3">
+              <a:hueOff val="0"/>
+              <a:satOff val="0"/>
+              <a:lumOff val="0"/>
+              <a:alphaOff val="0"/>
+            </a:schemeClr>
+          </a:fillRef>
+          <a:effectRef idx="0">
+            <a:schemeClr val="accent3">
+              <a:hueOff val="0"/>
+              <a:satOff val="0"/>
+              <a:lumOff val="0"/>
+              <a:alphaOff val="0"/>
+            </a:schemeClr>
+          </a:effectRef>
+          <a:fontRef idx="minor">
+            <a:schemeClr val="lt1"/>
+          </a:fontRef>
+        </p:style>
+      </p:sp>
+      <p:grpSp>
+        <p:nvGrpSpPr>
+          <p:cNvPr id="7" name="组合 6">
+            <a:extLst>
+              <a:ext uri="{FF2B5EF4-FFF2-40B4-BE49-F238E27FC236}">
+                <a16:creationId xmlns:a16="http://schemas.microsoft.com/office/drawing/2014/main" id="{AEB6080E-76FE-42FB-9B3A-D554A9CA8E41}"/>
+              </a:ext>
+            </a:extLst>
+          </p:cNvPr>
+          <p:cNvGrpSpPr/>
+          <p:nvPr/>
+        </p:nvGrpSpPr>
+        <p:grpSpPr>
+          <a:xfrm>
+            <a:off x="9368844" y="3049347"/>
+            <a:ext cx="1703415" cy="1493143"/>
+            <a:chOff x="6446614" y="837408"/>
+            <a:chExt cx="1703415" cy="1493143"/>
+          </a:xfrm>
+        </p:grpSpPr>
+        <p:sp>
+          <p:nvSpPr>
+            <p:cNvPr id="8" name="矩形 7">
+              <a:extLst>
+                <a:ext uri="{FF2B5EF4-FFF2-40B4-BE49-F238E27FC236}">
+                  <a16:creationId xmlns:a16="http://schemas.microsoft.com/office/drawing/2014/main" id="{8C6B704A-0377-4ED2-846C-3C437BACFEDC}"/>
+                </a:ext>
+              </a:extLst>
+            </p:cNvPr>
+            <p:cNvSpPr/>
+            <p:nvPr/>
+          </p:nvSpPr>
+          <p:spPr>
+            <a:xfrm>
+              <a:off x="6446614" y="837408"/>
+              <a:ext cx="1703415" cy="1493143"/>
+            </a:xfrm>
+            <a:prstGeom prst="rect">
+              <a:avLst/>
+            </a:prstGeom>
+          </p:spPr>
+          <p:style>
+            <a:lnRef idx="0">
+              <a:schemeClr val="dk1">
+                <a:alpha val="0"/>
+                <a:hueOff val="0"/>
+                <a:satOff val="0"/>
+                <a:lumOff val="0"/>
+                <a:alphaOff val="0"/>
+              </a:schemeClr>
+            </a:lnRef>
+            <a:fillRef idx="0">
+              <a:schemeClr val="lt1">
+                <a:alpha val="0"/>
+                <a:hueOff val="0"/>
+                <a:satOff val="0"/>
+                <a:lumOff val="0"/>
+                <a:alphaOff val="0"/>
+              </a:schemeClr>
+            </a:fillRef>
+            <a:effectRef idx="0">
+              <a:schemeClr val="lt1">
+                <a:alpha val="0"/>
+                <a:hueOff val="0"/>
+                <a:satOff val="0"/>
+                <a:lumOff val="0"/>
+                <a:alphaOff val="0"/>
+              </a:schemeClr>
+            </a:effectRef>
+            <a:fontRef idx="minor">
+              <a:schemeClr val="tx1">
+                <a:hueOff val="0"/>
+                <a:satOff val="0"/>
+                <a:lumOff val="0"/>
+                <a:alphaOff val="0"/>
+              </a:schemeClr>
+            </a:fontRef>
+          </p:style>
+        </p:sp>
+        <p:sp>
+          <p:nvSpPr>
+            <p:cNvPr id="9" name="文本框 8">
+              <a:extLst>
+                <a:ext uri="{FF2B5EF4-FFF2-40B4-BE49-F238E27FC236}">
+                  <a16:creationId xmlns:a16="http://schemas.microsoft.com/office/drawing/2014/main" id="{92D3E994-22FC-4732-9C59-CD388E88FC67}"/>
+                </a:ext>
+              </a:extLst>
+            </p:cNvPr>
+            <p:cNvSpPr txBox="1"/>
+            <p:nvPr/>
+          </p:nvSpPr>
+          <p:spPr>
+            <a:xfrm>
+              <a:off x="6446614" y="837408"/>
+              <a:ext cx="1703415" cy="1493143"/>
+            </a:xfrm>
+            <a:prstGeom prst="rect">
+              <a:avLst/>
+            </a:prstGeom>
+          </p:spPr>
+          <p:style>
+            <a:lnRef idx="0">
+              <a:scrgbClr r="0" g="0" b="0"/>
+            </a:lnRef>
+            <a:fillRef idx="0">
+              <a:scrgbClr r="0" g="0" b="0"/>
+            </a:fillRef>
+            <a:effectRef idx="0">
+              <a:scrgbClr r="0" g="0" b="0"/>
+            </a:effectRef>
+            <a:fontRef idx="minor">
+              <a:schemeClr val="tx1">
+                <a:hueOff val="0"/>
+                <a:satOff val="0"/>
+                <a:lumOff val="0"/>
+                <a:alphaOff val="0"/>
+              </a:schemeClr>
+            </a:fontRef>
+          </p:style>
+          <p:txBody>
+            <a:bodyPr spcFirstLastPara="0" vert="horz" wrap="square" lIns="182880" tIns="182880" rIns="0" bIns="68580" numCol="1" spcCol="1270" anchor="t" anchorCtr="0">
+              <a:noAutofit/>
+            </a:bodyPr>
+            <a:lstStyle/>
+            <a:p>
+              <a:pPr lvl="0" defTabSz="800100">
+                <a:lnSpc>
+                  <a:spcPct val="90000"/>
+                </a:lnSpc>
+                <a:spcBef>
+                  <a:spcPct val="0"/>
+                </a:spcBef>
+                <a:spcAft>
+                  <a:spcPct val="35000"/>
+                </a:spcAft>
+              </a:pPr>
+              <a:r>
+                <a:rPr lang="zh-CN" altLang="en-US" b="1" dirty="0">
+                  <a:latin typeface="微软雅黑" panose="020B0503020204020204" pitchFamily="34" charset="-122"/>
+                  <a:ea typeface="微软雅黑" panose="020B0503020204020204" pitchFamily="34" charset="-122"/>
+                </a:rPr>
+                <a:t>热熔胶枪</a:t>
+              </a:r>
+              <a:endParaRPr lang="en-US" sz="1800" b="1" kern="1200" dirty="0">
+                <a:latin typeface="微软雅黑" panose="020B0503020204020204" pitchFamily="34" charset="-122"/>
+                <a:ea typeface="微软雅黑" panose="020B0503020204020204" pitchFamily="34" charset="-122"/>
+              </a:endParaRPr>
+            </a:p>
+          </p:txBody>
+        </p:sp>
+      </p:grpSp>
+      <p:pic>
+        <p:nvPicPr>
+          <p:cNvPr id="12" name="图片 11">
+            <a:extLst>
+              <a:ext uri="{FF2B5EF4-FFF2-40B4-BE49-F238E27FC236}">
+                <a16:creationId xmlns:a16="http://schemas.microsoft.com/office/drawing/2014/main" id="{61F691A3-FD7F-4373-B7EB-30A6D1D59209}"/>
+              </a:ext>
+            </a:extLst>
+          </p:cNvPr>
+          <p:cNvPicPr>
+            <a:picLocks noChangeAspect="1"/>
+          </p:cNvPicPr>
+          <p:nvPr/>
+        </p:nvPicPr>
+        <p:blipFill>
+          <a:blip r:embed="rId9"/>
+          <a:stretch>
+            <a:fillRect/>
+          </a:stretch>
+        </p:blipFill>
+        <p:spPr>
+          <a:xfrm>
+            <a:off x="5284381" y="4980708"/>
+            <a:ext cx="1762034" cy="1741604"/>
+          </a:xfrm>
+          <a:prstGeom prst="rect">
+            <a:avLst/>
+          </a:prstGeom>
+        </p:spPr>
+      </p:pic>
+      <p:pic>
+        <p:nvPicPr>
+          <p:cNvPr id="2" name="图片 1">
+            <a:extLst>
+              <a:ext uri="{FF2B5EF4-FFF2-40B4-BE49-F238E27FC236}">
+                <a16:creationId xmlns:a16="http://schemas.microsoft.com/office/drawing/2014/main" id="{C1E8FEDF-9800-447C-85AD-E7E71916AA86}"/>
+              </a:ext>
+            </a:extLst>
+          </p:cNvPr>
+          <p:cNvPicPr>
+            <a:picLocks noChangeAspect="1"/>
+          </p:cNvPicPr>
+          <p:nvPr/>
+        </p:nvPicPr>
+        <p:blipFill>
+          <a:blip r:embed="rId10"/>
+          <a:stretch>
+            <a:fillRect/>
+          </a:stretch>
+        </p:blipFill>
+        <p:spPr>
+          <a:xfrm>
+            <a:off x="9513967" y="3636660"/>
+            <a:ext cx="1749239" cy="1498685"/>
+          </a:xfrm>
+          <a:prstGeom prst="rect">
+            <a:avLst/>
+          </a:prstGeom>
+        </p:spPr>
+      </p:pic>
+      <p:pic>
+        <p:nvPicPr>
+          <p:cNvPr id="3" name="图片 2">
+            <a:extLst>
+              <a:ext uri="{FF2B5EF4-FFF2-40B4-BE49-F238E27FC236}">
+                <a16:creationId xmlns:a16="http://schemas.microsoft.com/office/drawing/2014/main" id="{B4020C9D-52E5-40D4-B732-E64D190F7C8E}"/>
+              </a:ext>
+            </a:extLst>
+          </p:cNvPr>
+          <p:cNvPicPr>
+            <a:picLocks noChangeAspect="1"/>
+          </p:cNvPicPr>
+          <p:nvPr/>
+        </p:nvPicPr>
+        <p:blipFill>
+          <a:blip r:embed="rId11"/>
+          <a:stretch>
+            <a:fillRect/>
+          </a:stretch>
+        </p:blipFill>
+        <p:spPr>
+          <a:xfrm>
+            <a:off x="7276272" y="4300949"/>
+            <a:ext cx="1776697" cy="1359517"/>
+          </a:xfrm>
+          <a:prstGeom prst="rect">
+            <a:avLst/>
+          </a:prstGeom>
+        </p:spPr>
+      </p:pic>
+    </p:spTree>
+    <p:extLst>
+      <p:ext uri="{BB962C8B-B14F-4D97-AF65-F5344CB8AC3E}">
+        <p14:creationId xmlns:p14="http://schemas.microsoft.com/office/powerpoint/2010/main" val="2201758554"/>
+      </p:ext>
+    </p:extLst>
+  </p:cSld>
+  <p:clrMapOvr>
+    <a:masterClrMapping/>
+  </p:clrMapOvr>
+  <mc:AlternateContent xmlns:mc="http://schemas.openxmlformats.org/markup-compatibility/2006" xmlns:p14="http://schemas.microsoft.com/office/powerpoint/2010/main">
+    <mc:Choice Requires="p14">
+      <p:transition spd="slow" p14:dur="2000" advClick="0" advTm="5000"/>
+    </mc:Choice>
+    <mc:Fallback xmlns="">
+      <p:transition spd="slow" advClick="0" advTm="5000"/>
+    </mc:Fallback>
+  </mc:AlternateContent>
+</p:sld>
+</file>
+
+<file path=ppt/slides/slide11.xml><?xml version="1.0" encoding="utf-8"?>
 <p:sld xmlns:a="http://schemas.openxmlformats.org/drawingml/2006/main" xmlns:r="http://schemas.openxmlformats.org/officeDocument/2006/relationships" xmlns:p="http://schemas.openxmlformats.org/presentationml/2006/main">
   <p:cSld>
     <p:spTree>
@@ -7320,7 +7956,7 @@
 </p:sld>
 </file>
 
-<file path=ppt/slides/slide11.xml><?xml version="1.0" encoding="utf-8"?>
+<file path=ppt/slides/slide12.xml><?xml version="1.0" encoding="utf-8"?>
 <p:sld xmlns:a="http://schemas.openxmlformats.org/drawingml/2006/main" xmlns:r="http://schemas.openxmlformats.org/officeDocument/2006/relationships" xmlns:p="http://schemas.openxmlformats.org/presentationml/2006/main">
   <p:cSld>
     <p:spTree>
@@ -7799,7 +8435,7 @@
 </p:sld>
 </file>
 
-<file path=ppt/slides/slide12.xml><?xml version="1.0" encoding="utf-8"?>
+<file path=ppt/slides/slide13.xml><?xml version="1.0" encoding="utf-8"?>
 <p:sld xmlns:a="http://schemas.openxmlformats.org/drawingml/2006/main" xmlns:r="http://schemas.openxmlformats.org/officeDocument/2006/relationships" xmlns:p="http://schemas.openxmlformats.org/presentationml/2006/main">
   <p:cSld>
     <p:spTree>
@@ -12924,64 +13560,1343 @@
           <a:chExt cx="0" cy="0"/>
         </a:xfrm>
       </p:grpSpPr>
-      <p:graphicFrame>
-        <p:nvGraphicFramePr>
-          <p:cNvPr id="11" name="Diagram 29">
+      <p:grpSp>
+        <p:nvGrpSpPr>
+          <p:cNvPr id="63" name="组合 62">
             <a:extLst>
               <a:ext uri="{FF2B5EF4-FFF2-40B4-BE49-F238E27FC236}">
-                <a16:creationId xmlns:a16="http://schemas.microsoft.com/office/drawing/2014/main" id="{A887E04C-D6A6-4060-AB04-9DEA6C415D10}"/>
+                <a16:creationId xmlns:a16="http://schemas.microsoft.com/office/drawing/2014/main" id="{AE7E729B-60DB-43A2-9F60-CDC491B9BE4C}"/>
               </a:ext>
             </a:extLst>
           </p:cNvPr>
-          <p:cNvGraphicFramePr/>
-          <p:nvPr>
-            <p:extLst>
-              <p:ext uri="{D42A27DB-BD31-4B8C-83A1-F6EECF244321}">
-                <p14:modId xmlns:p14="http://schemas.microsoft.com/office/powerpoint/2010/main" val="337982066"/>
-              </p:ext>
-            </p:extLst>
-          </p:nvPr>
-        </p:nvGraphicFramePr>
-        <p:xfrm>
-          <a:off x="803959" y="2748976"/>
-          <a:ext cx="8153537" cy="4528697"/>
-        </p:xfrm>
-        <a:graphic>
-          <a:graphicData uri="http://schemas.openxmlformats.org/drawingml/2006/diagram">
-            <dgm:relIds xmlns:dgm="http://schemas.openxmlformats.org/drawingml/2006/diagram" xmlns:r="http://schemas.openxmlformats.org/officeDocument/2006/relationships" r:dm="rId3" r:lo="rId4" r:qs="rId5" r:cs="rId6"/>
-          </a:graphicData>
-        </a:graphic>
-      </p:graphicFrame>
-      <p:pic>
-        <p:nvPicPr>
-          <p:cNvPr id="13" name="图片 12">
+          <p:cNvGrpSpPr/>
+          <p:nvPr/>
+        </p:nvGrpSpPr>
+        <p:grpSpPr>
+          <a:xfrm>
+            <a:off x="2285808" y="3274048"/>
+            <a:ext cx="5654730" cy="1017069"/>
+            <a:chOff x="6354225" y="3234292"/>
+            <a:chExt cx="5016361" cy="1017069"/>
+          </a:xfrm>
+        </p:grpSpPr>
+        <p:sp>
+          <p:nvSpPr>
+            <p:cNvPr id="16" name="ïŝļíḍe">
+              <a:extLst>
+                <a:ext uri="{FF2B5EF4-FFF2-40B4-BE49-F238E27FC236}">
+                  <a16:creationId xmlns:a16="http://schemas.microsoft.com/office/drawing/2014/main" id="{8668618C-C6DA-405E-A83F-3C63C9F51B0E}"/>
+                </a:ext>
+              </a:extLst>
+            </p:cNvPr>
+            <p:cNvSpPr/>
+            <p:nvPr/>
+          </p:nvSpPr>
+          <p:spPr bwMode="auto">
+            <a:xfrm>
+              <a:off x="6596935" y="3234292"/>
+              <a:ext cx="4773651" cy="1017069"/>
+            </a:xfrm>
+            <a:prstGeom prst="roundRect">
+              <a:avLst>
+                <a:gd name="adj" fmla="val 50000"/>
+              </a:avLst>
+            </a:prstGeom>
+            <a:solidFill>
+              <a:schemeClr val="accent3"/>
+            </a:solidFill>
+            <a:ln w="9525">
+              <a:noFill/>
+              <a:round/>
+              <a:headEnd/>
+              <a:tailEnd/>
+            </a:ln>
+          </p:spPr>
+          <p:txBody>
+            <a:bodyPr anchor="ctr"/>
+            <a:lstStyle/>
+            <a:p>
+              <a:pPr algn="ctr"/>
+              <a:endParaRPr sz="2400">
+                <a:latin typeface="微软雅黑" panose="020B0503020204020204" pitchFamily="34" charset="-122"/>
+                <a:ea typeface="微软雅黑" panose="020B0503020204020204" pitchFamily="34" charset="-122"/>
+              </a:endParaRPr>
+            </a:p>
+          </p:txBody>
+        </p:sp>
+        <p:sp>
+          <p:nvSpPr>
+            <p:cNvPr id="17" name="iślîdê">
+              <a:extLst>
+                <a:ext uri="{FF2B5EF4-FFF2-40B4-BE49-F238E27FC236}">
+                  <a16:creationId xmlns:a16="http://schemas.microsoft.com/office/drawing/2014/main" id="{AFA96EDF-4C70-4204-BDC6-FEAAF8637DE3}"/>
+                </a:ext>
+              </a:extLst>
+            </p:cNvPr>
+            <p:cNvSpPr>
+              <a:spLocks/>
+            </p:cNvSpPr>
+            <p:nvPr/>
+          </p:nvSpPr>
+          <p:spPr bwMode="auto">
+            <a:xfrm>
+              <a:off x="7727536" y="3234292"/>
+              <a:ext cx="280072" cy="1017069"/>
+            </a:xfrm>
+            <a:custGeom>
+              <a:avLst/>
+              <a:gdLst/>
+              <a:ahLst/>
+              <a:cxnLst>
+                <a:cxn ang="0">
+                  <a:pos x="0" y="0"/>
+                </a:cxn>
+                <a:cxn ang="0">
+                  <a:pos x="0" y="292"/>
+                </a:cxn>
+                <a:cxn ang="0">
+                  <a:pos x="170" y="457"/>
+                </a:cxn>
+                <a:cxn ang="0">
+                  <a:pos x="0" y="621"/>
+                </a:cxn>
+                <a:cxn ang="0">
+                  <a:pos x="0" y="914"/>
+                </a:cxn>
+                <a:cxn ang="0">
+                  <a:pos x="20" y="914"/>
+                </a:cxn>
+                <a:cxn ang="0">
+                  <a:pos x="20" y="628"/>
+                </a:cxn>
+                <a:cxn ang="0">
+                  <a:pos x="198" y="457"/>
+                </a:cxn>
+                <a:cxn ang="0">
+                  <a:pos x="20" y="285"/>
+                </a:cxn>
+                <a:cxn ang="0">
+                  <a:pos x="20" y="0"/>
+                </a:cxn>
+                <a:cxn ang="0">
+                  <a:pos x="0" y="0"/>
+                </a:cxn>
+              </a:cxnLst>
+              <a:rect l="0" t="0" r="r" b="b"/>
+              <a:pathLst>
+                <a:path w="198" h="914">
+                  <a:moveTo>
+                    <a:pt x="0" y="0"/>
+                  </a:moveTo>
+                  <a:lnTo>
+                    <a:pt x="0" y="292"/>
+                  </a:lnTo>
+                  <a:lnTo>
+                    <a:pt x="170" y="457"/>
+                  </a:lnTo>
+                  <a:lnTo>
+                    <a:pt x="0" y="621"/>
+                  </a:lnTo>
+                  <a:lnTo>
+                    <a:pt x="0" y="914"/>
+                  </a:lnTo>
+                  <a:lnTo>
+                    <a:pt x="20" y="914"/>
+                  </a:lnTo>
+                  <a:lnTo>
+                    <a:pt x="20" y="628"/>
+                  </a:lnTo>
+                  <a:lnTo>
+                    <a:pt x="198" y="457"/>
+                  </a:lnTo>
+                  <a:lnTo>
+                    <a:pt x="20" y="285"/>
+                  </a:lnTo>
+                  <a:lnTo>
+                    <a:pt x="20" y="0"/>
+                  </a:lnTo>
+                  <a:lnTo>
+                    <a:pt x="0" y="0"/>
+                  </a:lnTo>
+                  <a:close/>
+                </a:path>
+              </a:pathLst>
+            </a:custGeom>
+            <a:solidFill>
+              <a:schemeClr val="bg1"/>
+            </a:solidFill>
+            <a:ln w="9525">
+              <a:noFill/>
+              <a:round/>
+              <a:headEnd/>
+              <a:tailEnd/>
+            </a:ln>
+            <a:effectLst/>
+          </p:spPr>
+          <p:txBody>
+            <a:bodyPr anchor="ctr"/>
+            <a:lstStyle/>
+            <a:p>
+              <a:pPr algn="ctr"/>
+              <a:endParaRPr sz="2400">
+                <a:latin typeface="微软雅黑" panose="020B0503020204020204" pitchFamily="34" charset="-122"/>
+                <a:ea typeface="微软雅黑" panose="020B0503020204020204" pitchFamily="34" charset="-122"/>
+              </a:endParaRPr>
+            </a:p>
+          </p:txBody>
+        </p:sp>
+        <p:sp>
+          <p:nvSpPr>
+            <p:cNvPr id="18" name="ï$ľîḑè">
+              <a:extLst>
+                <a:ext uri="{FF2B5EF4-FFF2-40B4-BE49-F238E27FC236}">
+                  <a16:creationId xmlns:a16="http://schemas.microsoft.com/office/drawing/2014/main" id="{3BD28150-D824-4BCD-9E54-F860CD55F557}"/>
+                </a:ext>
+              </a:extLst>
+            </p:cNvPr>
+            <p:cNvSpPr/>
+            <p:nvPr/>
+          </p:nvSpPr>
+          <p:spPr bwMode="auto">
+            <a:xfrm rot="16200000">
+              <a:off x="6307995" y="3650366"/>
+              <a:ext cx="277382" cy="184922"/>
+            </a:xfrm>
+            <a:prstGeom prst="triangle">
+              <a:avLst/>
+            </a:prstGeom>
+            <a:solidFill>
+              <a:schemeClr val="accent3"/>
+            </a:solidFill>
+            <a:ln w="9525">
+              <a:noFill/>
+              <a:round/>
+              <a:headEnd/>
+              <a:tailEnd/>
+            </a:ln>
+          </p:spPr>
+          <p:txBody>
+            <a:bodyPr anchor="ctr"/>
+            <a:lstStyle/>
+            <a:p>
+              <a:pPr algn="ctr"/>
+              <a:endParaRPr sz="2400">
+                <a:latin typeface="微软雅黑" panose="020B0503020204020204" pitchFamily="34" charset="-122"/>
+                <a:ea typeface="微软雅黑" panose="020B0503020204020204" pitchFamily="34" charset="-122"/>
+              </a:endParaRPr>
+            </a:p>
+          </p:txBody>
+        </p:sp>
+        <p:sp>
+          <p:nvSpPr>
+            <p:cNvPr id="30" name="íşľiḑê">
+              <a:extLst>
+                <a:ext uri="{FF2B5EF4-FFF2-40B4-BE49-F238E27FC236}">
+                  <a16:creationId xmlns:a16="http://schemas.microsoft.com/office/drawing/2014/main" id="{56507740-6D94-4296-B14E-574400A2492D}"/>
+                </a:ext>
+              </a:extLst>
+            </p:cNvPr>
+            <p:cNvSpPr txBox="1"/>
+            <p:nvPr/>
+          </p:nvSpPr>
+          <p:spPr>
+            <a:xfrm flipH="1">
+              <a:off x="6822936" y="3556100"/>
+              <a:ext cx="716414" cy="307777"/>
+            </a:xfrm>
+            <a:prstGeom prst="rect">
+              <a:avLst/>
+            </a:prstGeom>
+            <a:noFill/>
+            <a:effectLst/>
+          </p:spPr>
+          <p:txBody>
+            <a:bodyPr wrap="none">
+              <a:noAutofit/>
+            </a:bodyPr>
+            <a:lstStyle/>
+            <a:p>
+              <a:pPr algn="ctr"/>
+              <a:r>
+                <a:rPr lang="en-US" altLang="zh-CN" b="1" dirty="0">
+                  <a:solidFill>
+                    <a:schemeClr val="bg1"/>
+                  </a:solidFill>
+                  <a:latin typeface="微软雅黑" panose="020B0503020204020204" pitchFamily="34" charset="-122"/>
+                  <a:ea typeface="微软雅黑" panose="020B0503020204020204" pitchFamily="34" charset="-122"/>
+                </a:rPr>
+                <a:t>2.</a:t>
+              </a:r>
+              <a:endParaRPr lang="en-US" b="1" dirty="0">
+                <a:solidFill>
+                  <a:schemeClr val="bg1"/>
+                </a:solidFill>
+                <a:latin typeface="微软雅黑" panose="020B0503020204020204" pitchFamily="34" charset="-122"/>
+                <a:ea typeface="微软雅黑" panose="020B0503020204020204" pitchFamily="34" charset="-122"/>
+              </a:endParaRPr>
+            </a:p>
+          </p:txBody>
+        </p:sp>
+      </p:grpSp>
+      <p:grpSp>
+        <p:nvGrpSpPr>
+          <p:cNvPr id="62" name="组合 61">
             <a:extLst>
               <a:ext uri="{FF2B5EF4-FFF2-40B4-BE49-F238E27FC236}">
-                <a16:creationId xmlns:a16="http://schemas.microsoft.com/office/drawing/2014/main" id="{FC574232-914F-4D39-996B-BD244B17B352}"/>
+                <a16:creationId xmlns:a16="http://schemas.microsoft.com/office/drawing/2014/main" id="{15D54DC1-D912-4AF2-82A3-EC9D1A623722}"/>
               </a:ext>
             </a:extLst>
           </p:cNvPr>
-          <p:cNvPicPr>
-            <a:picLocks noChangeAspect="1"/>
-          </p:cNvPicPr>
+          <p:cNvGrpSpPr/>
           <p:nvPr/>
-        </p:nvPicPr>
-        <p:blipFill>
-          <a:blip r:embed="rId8"/>
-          <a:stretch>
-            <a:fillRect/>
-          </a:stretch>
-        </p:blipFill>
-        <p:spPr>
+        </p:nvGrpSpPr>
+        <p:grpSpPr>
           <a:xfrm>
-            <a:off x="3204133" y="5660466"/>
-            <a:ext cx="1619250" cy="1304925"/>
+            <a:off x="2285808" y="2002712"/>
+            <a:ext cx="5535492" cy="1017069"/>
+            <a:chOff x="6354225" y="1962956"/>
+            <a:chExt cx="5016361" cy="1017069"/>
+          </a:xfrm>
+        </p:grpSpPr>
+        <p:sp>
+          <p:nvSpPr>
+            <p:cNvPr id="10" name="ïṡlîḓè">
+              <a:extLst>
+                <a:ext uri="{FF2B5EF4-FFF2-40B4-BE49-F238E27FC236}">
+                  <a16:creationId xmlns:a16="http://schemas.microsoft.com/office/drawing/2014/main" id="{3C5EE76B-4BC2-4CE0-874D-A71EFD3BFA1F}"/>
+                </a:ext>
+              </a:extLst>
+            </p:cNvPr>
+            <p:cNvSpPr/>
+            <p:nvPr/>
+          </p:nvSpPr>
+          <p:spPr bwMode="auto">
+            <a:xfrm>
+              <a:off x="6596935" y="1962956"/>
+              <a:ext cx="4773651" cy="1017069"/>
+            </a:xfrm>
+            <a:prstGeom prst="roundRect">
+              <a:avLst>
+                <a:gd name="adj" fmla="val 50000"/>
+              </a:avLst>
+            </a:prstGeom>
+            <a:solidFill>
+              <a:schemeClr val="accent5"/>
+            </a:solidFill>
+            <a:ln w="9525">
+              <a:noFill/>
+              <a:round/>
+              <a:headEnd/>
+              <a:tailEnd/>
+            </a:ln>
+          </p:spPr>
+          <p:txBody>
+            <a:bodyPr anchor="ctr"/>
+            <a:lstStyle/>
+            <a:p>
+              <a:pPr algn="ctr"/>
+              <a:endParaRPr sz="2400">
+                <a:latin typeface="微软雅黑" panose="020B0503020204020204" pitchFamily="34" charset="-122"/>
+                <a:ea typeface="微软雅黑" panose="020B0503020204020204" pitchFamily="34" charset="-122"/>
+              </a:endParaRPr>
+            </a:p>
+          </p:txBody>
+        </p:sp>
+        <p:sp>
+          <p:nvSpPr>
+            <p:cNvPr id="11" name="ïṩ1îďê">
+              <a:extLst>
+                <a:ext uri="{FF2B5EF4-FFF2-40B4-BE49-F238E27FC236}">
+                  <a16:creationId xmlns:a16="http://schemas.microsoft.com/office/drawing/2014/main" id="{B3047CE1-072C-41A7-BF0A-47E838CDD443}"/>
+                </a:ext>
+              </a:extLst>
+            </p:cNvPr>
+            <p:cNvSpPr>
+              <a:spLocks/>
+            </p:cNvSpPr>
+            <p:nvPr/>
+          </p:nvSpPr>
+          <p:spPr bwMode="auto">
+            <a:xfrm>
+              <a:off x="7727536" y="1962956"/>
+              <a:ext cx="280072" cy="1017069"/>
+            </a:xfrm>
+            <a:custGeom>
+              <a:avLst/>
+              <a:gdLst/>
+              <a:ahLst/>
+              <a:cxnLst>
+                <a:cxn ang="0">
+                  <a:pos x="0" y="0"/>
+                </a:cxn>
+                <a:cxn ang="0">
+                  <a:pos x="0" y="292"/>
+                </a:cxn>
+                <a:cxn ang="0">
+                  <a:pos x="170" y="457"/>
+                </a:cxn>
+                <a:cxn ang="0">
+                  <a:pos x="0" y="621"/>
+                </a:cxn>
+                <a:cxn ang="0">
+                  <a:pos x="0" y="914"/>
+                </a:cxn>
+                <a:cxn ang="0">
+                  <a:pos x="20" y="914"/>
+                </a:cxn>
+                <a:cxn ang="0">
+                  <a:pos x="20" y="628"/>
+                </a:cxn>
+                <a:cxn ang="0">
+                  <a:pos x="198" y="457"/>
+                </a:cxn>
+                <a:cxn ang="0">
+                  <a:pos x="20" y="285"/>
+                </a:cxn>
+                <a:cxn ang="0">
+                  <a:pos x="20" y="0"/>
+                </a:cxn>
+                <a:cxn ang="0">
+                  <a:pos x="0" y="0"/>
+                </a:cxn>
+              </a:cxnLst>
+              <a:rect l="0" t="0" r="r" b="b"/>
+              <a:pathLst>
+                <a:path w="198" h="914">
+                  <a:moveTo>
+                    <a:pt x="0" y="0"/>
+                  </a:moveTo>
+                  <a:lnTo>
+                    <a:pt x="0" y="292"/>
+                  </a:lnTo>
+                  <a:lnTo>
+                    <a:pt x="170" y="457"/>
+                  </a:lnTo>
+                  <a:lnTo>
+                    <a:pt x="0" y="621"/>
+                  </a:lnTo>
+                  <a:lnTo>
+                    <a:pt x="0" y="914"/>
+                  </a:lnTo>
+                  <a:lnTo>
+                    <a:pt x="20" y="914"/>
+                  </a:lnTo>
+                  <a:lnTo>
+                    <a:pt x="20" y="628"/>
+                  </a:lnTo>
+                  <a:lnTo>
+                    <a:pt x="198" y="457"/>
+                  </a:lnTo>
+                  <a:lnTo>
+                    <a:pt x="20" y="285"/>
+                  </a:lnTo>
+                  <a:lnTo>
+                    <a:pt x="20" y="0"/>
+                  </a:lnTo>
+                  <a:lnTo>
+                    <a:pt x="0" y="0"/>
+                  </a:lnTo>
+                  <a:close/>
+                </a:path>
+              </a:pathLst>
+            </a:custGeom>
+            <a:solidFill>
+              <a:schemeClr val="bg1"/>
+            </a:solidFill>
+            <a:ln w="9525">
+              <a:noFill/>
+              <a:round/>
+              <a:headEnd/>
+              <a:tailEnd/>
+            </a:ln>
+            <a:effectLst/>
+          </p:spPr>
+          <p:txBody>
+            <a:bodyPr anchor="ctr"/>
+            <a:lstStyle/>
+            <a:p>
+              <a:pPr algn="ctr"/>
+              <a:endParaRPr sz="2400">
+                <a:latin typeface="微软雅黑" panose="020B0503020204020204" pitchFamily="34" charset="-122"/>
+                <a:ea typeface="微软雅黑" panose="020B0503020204020204" pitchFamily="34" charset="-122"/>
+              </a:endParaRPr>
+            </a:p>
+          </p:txBody>
+        </p:sp>
+        <p:sp>
+          <p:nvSpPr>
+            <p:cNvPr id="12" name="iṡ1ïdé">
+              <a:extLst>
+                <a:ext uri="{FF2B5EF4-FFF2-40B4-BE49-F238E27FC236}">
+                  <a16:creationId xmlns:a16="http://schemas.microsoft.com/office/drawing/2014/main" id="{CC658995-22BF-42D7-9994-06A948C732E7}"/>
+                </a:ext>
+              </a:extLst>
+            </p:cNvPr>
+            <p:cNvSpPr/>
+            <p:nvPr/>
+          </p:nvSpPr>
+          <p:spPr bwMode="auto">
+            <a:xfrm rot="16200000">
+              <a:off x="6307995" y="2379030"/>
+              <a:ext cx="277382" cy="184922"/>
+            </a:xfrm>
+            <a:prstGeom prst="triangle">
+              <a:avLst/>
+            </a:prstGeom>
+            <a:solidFill>
+              <a:schemeClr val="accent5"/>
+            </a:solidFill>
+            <a:ln w="9525">
+              <a:noFill/>
+              <a:round/>
+              <a:headEnd/>
+              <a:tailEnd/>
+            </a:ln>
+          </p:spPr>
+          <p:txBody>
+            <a:bodyPr anchor="ctr"/>
+            <a:lstStyle/>
+            <a:p>
+              <a:pPr algn="ctr"/>
+              <a:endParaRPr sz="2400">
+                <a:latin typeface="微软雅黑" panose="020B0503020204020204" pitchFamily="34" charset="-122"/>
+                <a:ea typeface="微软雅黑" panose="020B0503020204020204" pitchFamily="34" charset="-122"/>
+              </a:endParaRPr>
+            </a:p>
+          </p:txBody>
+        </p:sp>
+        <p:sp>
+          <p:nvSpPr>
+            <p:cNvPr id="36" name="iṥľîḍe">
+              <a:extLst>
+                <a:ext uri="{FF2B5EF4-FFF2-40B4-BE49-F238E27FC236}">
+                  <a16:creationId xmlns:a16="http://schemas.microsoft.com/office/drawing/2014/main" id="{822E2D93-45E4-47CA-BF5F-53F78FFD75FE}"/>
+                </a:ext>
+              </a:extLst>
+            </p:cNvPr>
+            <p:cNvSpPr txBox="1"/>
+            <p:nvPr/>
+          </p:nvSpPr>
+          <p:spPr>
+            <a:xfrm flipH="1">
+              <a:off x="6818801" y="2284763"/>
+              <a:ext cx="771365" cy="307777"/>
+            </a:xfrm>
+            <a:prstGeom prst="rect">
+              <a:avLst/>
+            </a:prstGeom>
+            <a:noFill/>
+            <a:effectLst/>
+          </p:spPr>
+          <p:txBody>
+            <a:bodyPr wrap="none">
+              <a:noAutofit/>
+            </a:bodyPr>
+            <a:lstStyle/>
+            <a:p>
+              <a:pPr algn="ctr"/>
+              <a:r>
+                <a:rPr lang="en-US" altLang="zh-CN" b="1" dirty="0">
+                  <a:solidFill>
+                    <a:schemeClr val="bg1"/>
+                  </a:solidFill>
+                  <a:latin typeface="微软雅黑" panose="020B0503020204020204" pitchFamily="34" charset="-122"/>
+                  <a:ea typeface="微软雅黑" panose="020B0503020204020204" pitchFamily="34" charset="-122"/>
+                </a:rPr>
+                <a:t>1.</a:t>
+              </a:r>
+              <a:endParaRPr lang="en-US" b="1" dirty="0">
+                <a:solidFill>
+                  <a:schemeClr val="bg1"/>
+                </a:solidFill>
+                <a:latin typeface="微软雅黑" panose="020B0503020204020204" pitchFamily="34" charset="-122"/>
+                <a:ea typeface="微软雅黑" panose="020B0503020204020204" pitchFamily="34" charset="-122"/>
+              </a:endParaRPr>
+            </a:p>
+          </p:txBody>
+        </p:sp>
+      </p:grpSp>
+      <p:sp>
+        <p:nvSpPr>
+          <p:cNvPr id="56" name="íślidé">
+            <a:extLst>
+              <a:ext uri="{FF2B5EF4-FFF2-40B4-BE49-F238E27FC236}">
+                <a16:creationId xmlns:a16="http://schemas.microsoft.com/office/drawing/2014/main" id="{0F71A57E-EC46-4DAA-BA22-C465E9AAAE20}"/>
+              </a:ext>
+            </a:extLst>
+          </p:cNvPr>
+          <p:cNvSpPr txBox="1">
+            <a:spLocks/>
+          </p:cNvSpPr>
+          <p:nvPr/>
+        </p:nvSpPr>
+        <p:spPr bwMode="auto">
+          <a:xfrm>
+            <a:off x="3702349" y="2351537"/>
+            <a:ext cx="2879568" cy="309958"/>
           </a:xfrm>
           <a:prstGeom prst="rect">
             <a:avLst/>
           </a:prstGeom>
+          <a:noFill/>
         </p:spPr>
-      </p:pic>
+        <p:txBody>
+          <a:bodyPr wrap="none" lIns="432000" tIns="0" rIns="216000" bIns="0" anchor="ctr" anchorCtr="0">
+            <a:normAutofit/>
+          </a:bodyPr>
+          <a:lstStyle/>
+          <a:p>
+            <a:r>
+              <a:rPr lang="zh-CN" altLang="en-US" b="1" dirty="0">
+                <a:solidFill>
+                  <a:schemeClr val="bg1"/>
+                </a:solidFill>
+                <a:latin typeface="微软雅黑" panose="020B0503020204020204" pitchFamily="34" charset="-122"/>
+                <a:ea typeface="微软雅黑" panose="020B0503020204020204" pitchFamily="34" charset="-122"/>
+              </a:rPr>
+              <a:t>掌握如何拼装一辆拥有带有摄像头的智能小车</a:t>
+            </a:r>
+            <a:endParaRPr lang="zh-CN" altLang="en-US" b="1" dirty="0">
+              <a:solidFill>
+                <a:srgbClr val="FFFF00"/>
+              </a:solidFill>
+              <a:effectLst/>
+              <a:latin typeface="微软雅黑" panose="020B0503020204020204" pitchFamily="34" charset="-122"/>
+              <a:ea typeface="微软雅黑" panose="020B0503020204020204" pitchFamily="34" charset="-122"/>
+            </a:endParaRPr>
+          </a:p>
+        </p:txBody>
+      </p:sp>
+      <p:grpSp>
+        <p:nvGrpSpPr>
+          <p:cNvPr id="61" name="组合 60">
+            <a:extLst>
+              <a:ext uri="{FF2B5EF4-FFF2-40B4-BE49-F238E27FC236}">
+                <a16:creationId xmlns:a16="http://schemas.microsoft.com/office/drawing/2014/main" id="{635E948D-E9D7-4E5B-97DE-1655536B14D3}"/>
+              </a:ext>
+            </a:extLst>
+          </p:cNvPr>
+          <p:cNvGrpSpPr/>
+          <p:nvPr/>
+        </p:nvGrpSpPr>
+        <p:grpSpPr>
+          <a:xfrm>
+            <a:off x="2285808" y="3326420"/>
+            <a:ext cx="6373862" cy="2239886"/>
+            <a:chOff x="6354225" y="3286664"/>
+            <a:chExt cx="5776107" cy="2239886"/>
+          </a:xfrm>
+        </p:grpSpPr>
+        <p:sp>
+          <p:nvSpPr>
+            <p:cNvPr id="4" name="îşḷiḋé">
+              <a:extLst>
+                <a:ext uri="{FF2B5EF4-FFF2-40B4-BE49-F238E27FC236}">
+                  <a16:creationId xmlns:a16="http://schemas.microsoft.com/office/drawing/2014/main" id="{6A4B724E-0D60-4C88-AFEB-B8C63BA39944}"/>
+                </a:ext>
+              </a:extLst>
+            </p:cNvPr>
+            <p:cNvSpPr/>
+            <p:nvPr/>
+          </p:nvSpPr>
+          <p:spPr bwMode="auto">
+            <a:xfrm>
+              <a:off x="6596935" y="4509481"/>
+              <a:ext cx="4773651" cy="1017069"/>
+            </a:xfrm>
+            <a:prstGeom prst="roundRect">
+              <a:avLst>
+                <a:gd name="adj" fmla="val 50000"/>
+              </a:avLst>
+            </a:prstGeom>
+            <a:solidFill>
+              <a:schemeClr val="accent1"/>
+            </a:solidFill>
+            <a:ln w="9525">
+              <a:noFill/>
+              <a:round/>
+              <a:headEnd/>
+              <a:tailEnd/>
+            </a:ln>
+          </p:spPr>
+          <p:txBody>
+            <a:bodyPr anchor="ctr"/>
+            <a:lstStyle/>
+            <a:p>
+              <a:pPr algn="ctr"/>
+              <a:endParaRPr sz="2400">
+                <a:latin typeface="微软雅黑" panose="020B0503020204020204" pitchFamily="34" charset="-122"/>
+                <a:ea typeface="微软雅黑" panose="020B0503020204020204" pitchFamily="34" charset="-122"/>
+              </a:endParaRPr>
+            </a:p>
+          </p:txBody>
+        </p:sp>
+        <p:sp>
+          <p:nvSpPr>
+            <p:cNvPr id="5" name="ïśļíḑé">
+              <a:extLst>
+                <a:ext uri="{FF2B5EF4-FFF2-40B4-BE49-F238E27FC236}">
+                  <a16:creationId xmlns:a16="http://schemas.microsoft.com/office/drawing/2014/main" id="{A82EDC93-A736-4DEE-9C63-4BECE40A9F7A}"/>
+                </a:ext>
+              </a:extLst>
+            </p:cNvPr>
+            <p:cNvSpPr>
+              <a:spLocks/>
+            </p:cNvSpPr>
+            <p:nvPr/>
+          </p:nvSpPr>
+          <p:spPr bwMode="auto">
+            <a:xfrm>
+              <a:off x="7727536" y="4509481"/>
+              <a:ext cx="280072" cy="1017069"/>
+            </a:xfrm>
+            <a:custGeom>
+              <a:avLst/>
+              <a:gdLst/>
+              <a:ahLst/>
+              <a:cxnLst>
+                <a:cxn ang="0">
+                  <a:pos x="0" y="0"/>
+                </a:cxn>
+                <a:cxn ang="0">
+                  <a:pos x="0" y="292"/>
+                </a:cxn>
+                <a:cxn ang="0">
+                  <a:pos x="170" y="457"/>
+                </a:cxn>
+                <a:cxn ang="0">
+                  <a:pos x="0" y="621"/>
+                </a:cxn>
+                <a:cxn ang="0">
+                  <a:pos x="0" y="914"/>
+                </a:cxn>
+                <a:cxn ang="0">
+                  <a:pos x="20" y="914"/>
+                </a:cxn>
+                <a:cxn ang="0">
+                  <a:pos x="20" y="628"/>
+                </a:cxn>
+                <a:cxn ang="0">
+                  <a:pos x="198" y="457"/>
+                </a:cxn>
+                <a:cxn ang="0">
+                  <a:pos x="20" y="285"/>
+                </a:cxn>
+                <a:cxn ang="0">
+                  <a:pos x="20" y="0"/>
+                </a:cxn>
+                <a:cxn ang="0">
+                  <a:pos x="0" y="0"/>
+                </a:cxn>
+              </a:cxnLst>
+              <a:rect l="0" t="0" r="r" b="b"/>
+              <a:pathLst>
+                <a:path w="198" h="914">
+                  <a:moveTo>
+                    <a:pt x="0" y="0"/>
+                  </a:moveTo>
+                  <a:lnTo>
+                    <a:pt x="0" y="292"/>
+                  </a:lnTo>
+                  <a:lnTo>
+                    <a:pt x="170" y="457"/>
+                  </a:lnTo>
+                  <a:lnTo>
+                    <a:pt x="0" y="621"/>
+                  </a:lnTo>
+                  <a:lnTo>
+                    <a:pt x="0" y="914"/>
+                  </a:lnTo>
+                  <a:lnTo>
+                    <a:pt x="20" y="914"/>
+                  </a:lnTo>
+                  <a:lnTo>
+                    <a:pt x="20" y="628"/>
+                  </a:lnTo>
+                  <a:lnTo>
+                    <a:pt x="198" y="457"/>
+                  </a:lnTo>
+                  <a:lnTo>
+                    <a:pt x="20" y="285"/>
+                  </a:lnTo>
+                  <a:lnTo>
+                    <a:pt x="20" y="0"/>
+                  </a:lnTo>
+                  <a:lnTo>
+                    <a:pt x="0" y="0"/>
+                  </a:lnTo>
+                  <a:close/>
+                </a:path>
+              </a:pathLst>
+            </a:custGeom>
+            <a:solidFill>
+              <a:schemeClr val="bg1"/>
+            </a:solidFill>
+            <a:ln w="9525">
+              <a:noFill/>
+              <a:round/>
+              <a:headEnd/>
+              <a:tailEnd/>
+            </a:ln>
+            <a:effectLst/>
+          </p:spPr>
+          <p:txBody>
+            <a:bodyPr anchor="ctr"/>
+            <a:lstStyle/>
+            <a:p>
+              <a:pPr algn="ctr"/>
+              <a:endParaRPr sz="2400">
+                <a:latin typeface="微软雅黑" panose="020B0503020204020204" pitchFamily="34" charset="-122"/>
+                <a:ea typeface="微软雅黑" panose="020B0503020204020204" pitchFamily="34" charset="-122"/>
+              </a:endParaRPr>
+            </a:p>
+          </p:txBody>
+        </p:sp>
+        <p:sp>
+          <p:nvSpPr>
+            <p:cNvPr id="6" name="îsľiḑè">
+              <a:extLst>
+                <a:ext uri="{FF2B5EF4-FFF2-40B4-BE49-F238E27FC236}">
+                  <a16:creationId xmlns:a16="http://schemas.microsoft.com/office/drawing/2014/main" id="{27B30903-1C23-4554-85DF-C7C7120D2FA2}"/>
+                </a:ext>
+              </a:extLst>
+            </p:cNvPr>
+            <p:cNvSpPr/>
+            <p:nvPr/>
+          </p:nvSpPr>
+          <p:spPr bwMode="auto">
+            <a:xfrm rot="16200000">
+              <a:off x="6307995" y="4925555"/>
+              <a:ext cx="277382" cy="184922"/>
+            </a:xfrm>
+            <a:prstGeom prst="triangle">
+              <a:avLst/>
+            </a:prstGeom>
+            <a:solidFill>
+              <a:schemeClr val="accent1"/>
+            </a:solidFill>
+            <a:ln w="9525">
+              <a:noFill/>
+              <a:round/>
+              <a:headEnd/>
+              <a:tailEnd/>
+            </a:ln>
+          </p:spPr>
+          <p:txBody>
+            <a:bodyPr anchor="ctr"/>
+            <a:lstStyle/>
+            <a:p>
+              <a:pPr algn="ctr"/>
+              <a:endParaRPr sz="2400">
+                <a:latin typeface="微软雅黑" panose="020B0503020204020204" pitchFamily="34" charset="-122"/>
+                <a:ea typeface="微软雅黑" panose="020B0503020204020204" pitchFamily="34" charset="-122"/>
+              </a:endParaRPr>
+            </a:p>
+          </p:txBody>
+        </p:sp>
+        <p:sp>
+          <p:nvSpPr>
+            <p:cNvPr id="24" name="ïṩļíďe">
+              <a:extLst>
+                <a:ext uri="{FF2B5EF4-FFF2-40B4-BE49-F238E27FC236}">
+                  <a16:creationId xmlns:a16="http://schemas.microsoft.com/office/drawing/2014/main" id="{7BA50B3D-3154-492C-8952-F638FAC74CE2}"/>
+                </a:ext>
+              </a:extLst>
+            </p:cNvPr>
+            <p:cNvSpPr txBox="1"/>
+            <p:nvPr/>
+          </p:nvSpPr>
+          <p:spPr>
+            <a:xfrm flipH="1">
+              <a:off x="6804585" y="4831289"/>
+              <a:ext cx="692818" cy="307777"/>
+            </a:xfrm>
+            <a:prstGeom prst="rect">
+              <a:avLst/>
+            </a:prstGeom>
+            <a:noFill/>
+            <a:effectLst/>
+          </p:spPr>
+          <p:txBody>
+            <a:bodyPr wrap="none">
+              <a:noAutofit/>
+            </a:bodyPr>
+            <a:lstStyle/>
+            <a:p>
+              <a:pPr algn="ctr"/>
+              <a:r>
+                <a:rPr lang="en-US" altLang="zh-CN" b="1" dirty="0">
+                  <a:solidFill>
+                    <a:schemeClr val="bg1"/>
+                  </a:solidFill>
+                  <a:latin typeface="微软雅黑" panose="020B0503020204020204" pitchFamily="34" charset="-122"/>
+                  <a:ea typeface="微软雅黑" panose="020B0503020204020204" pitchFamily="34" charset="-122"/>
+                </a:rPr>
+                <a:t>3.</a:t>
+              </a:r>
+              <a:endParaRPr lang="en-US" b="1" dirty="0">
+                <a:solidFill>
+                  <a:schemeClr val="bg1"/>
+                </a:solidFill>
+                <a:latin typeface="微软雅黑" panose="020B0503020204020204" pitchFamily="34" charset="-122"/>
+                <a:ea typeface="微软雅黑" panose="020B0503020204020204" pitchFamily="34" charset="-122"/>
+              </a:endParaRPr>
+            </a:p>
+          </p:txBody>
+        </p:sp>
+        <p:sp>
+          <p:nvSpPr>
+            <p:cNvPr id="48" name="iṧľïḓe">
+              <a:extLst>
+                <a:ext uri="{FF2B5EF4-FFF2-40B4-BE49-F238E27FC236}">
+                  <a16:creationId xmlns:a16="http://schemas.microsoft.com/office/drawing/2014/main" id="{84C7537E-8A0C-43C3-8CA4-B3B0A29B9674}"/>
+                </a:ext>
+              </a:extLst>
+            </p:cNvPr>
+            <p:cNvSpPr txBox="1">
+              <a:spLocks/>
+            </p:cNvSpPr>
+            <p:nvPr/>
+          </p:nvSpPr>
+          <p:spPr bwMode="auto">
+            <a:xfrm>
+              <a:off x="7804365" y="3286664"/>
+              <a:ext cx="4325967" cy="912324"/>
+            </a:xfrm>
+            <a:prstGeom prst="rect">
+              <a:avLst/>
+            </a:prstGeom>
+            <a:noFill/>
+          </p:spPr>
+          <p:txBody>
+            <a:bodyPr wrap="none" lIns="432000" tIns="0" rIns="360000" bIns="0" anchor="ctr" anchorCtr="0">
+              <a:normAutofit/>
+            </a:bodyPr>
+            <a:lstStyle/>
+            <a:p>
+              <a:r>
+                <a:rPr lang="zh-CN" altLang="en-US" b="1" dirty="0">
+                  <a:solidFill>
+                    <a:schemeClr val="bg1"/>
+                  </a:solidFill>
+                  <a:latin typeface="微软雅黑" panose="020B0503020204020204" pitchFamily="34" charset="-122"/>
+                  <a:ea typeface="微软雅黑" panose="020B0503020204020204" pitchFamily="34" charset="-122"/>
+                </a:rPr>
+                <a:t>掌握如何利用树莓派套件</a:t>
+              </a:r>
+              <a:endParaRPr lang="zh-CN" altLang="zh-CN" b="1" dirty="0">
+                <a:solidFill>
+                  <a:srgbClr val="FFFF00"/>
+                </a:solidFill>
+                <a:latin typeface="微软雅黑" panose="020B0503020204020204" pitchFamily="34" charset="-122"/>
+                <a:ea typeface="微软雅黑" panose="020B0503020204020204" pitchFamily="34" charset="-122"/>
+              </a:endParaRPr>
+            </a:p>
+          </p:txBody>
+        </p:sp>
+      </p:grpSp>
+      <p:grpSp>
+        <p:nvGrpSpPr>
+          <p:cNvPr id="64" name="组合 63">
+            <a:extLst>
+              <a:ext uri="{FF2B5EF4-FFF2-40B4-BE49-F238E27FC236}">
+                <a16:creationId xmlns:a16="http://schemas.microsoft.com/office/drawing/2014/main" id="{33F1B86B-679B-483A-BB25-442D119764B0}"/>
+              </a:ext>
+            </a:extLst>
+          </p:cNvPr>
+          <p:cNvGrpSpPr/>
+          <p:nvPr/>
+        </p:nvGrpSpPr>
+        <p:grpSpPr>
+          <a:xfrm>
+            <a:off x="1869734" y="2025827"/>
+            <a:ext cx="277382" cy="3511200"/>
+            <a:chOff x="5938151" y="1986071"/>
+            <a:chExt cx="277382" cy="3511200"/>
+          </a:xfrm>
+        </p:grpSpPr>
+        <p:cxnSp>
+          <p:nvCxnSpPr>
+            <p:cNvPr id="22" name="Straight Connector 91">
+              <a:extLst>
+                <a:ext uri="{FF2B5EF4-FFF2-40B4-BE49-F238E27FC236}">
+                  <a16:creationId xmlns:a16="http://schemas.microsoft.com/office/drawing/2014/main" id="{29B26B38-312B-4DA5-9D01-87300C973A8B}"/>
+                </a:ext>
+              </a:extLst>
+            </p:cNvPr>
+            <p:cNvCxnSpPr/>
+            <p:nvPr/>
+          </p:nvCxnSpPr>
+          <p:spPr>
+            <a:xfrm rot="5400000">
+              <a:off x="5910413" y="5329878"/>
+              <a:ext cx="332859" cy="1927"/>
+            </a:xfrm>
+            <a:prstGeom prst="line">
+              <a:avLst/>
+            </a:prstGeom>
+            <a:ln w="28575">
+              <a:prstDash val="sysDash"/>
+            </a:ln>
+          </p:spPr>
+          <p:style>
+            <a:lnRef idx="1">
+              <a:schemeClr val="accent1"/>
+            </a:lnRef>
+            <a:fillRef idx="0">
+              <a:schemeClr val="accent1"/>
+            </a:fillRef>
+            <a:effectRef idx="0">
+              <a:schemeClr val="accent1"/>
+            </a:effectRef>
+            <a:fontRef idx="minor">
+              <a:schemeClr val="tx1"/>
+            </a:fontRef>
+          </p:style>
+        </p:cxnSp>
+        <p:sp>
+          <p:nvSpPr>
+            <p:cNvPr id="23" name="iṣḻíḍe">
+              <a:extLst>
+                <a:ext uri="{FF2B5EF4-FFF2-40B4-BE49-F238E27FC236}">
+                  <a16:creationId xmlns:a16="http://schemas.microsoft.com/office/drawing/2014/main" id="{9D39B86C-FDE7-488A-904F-57D40843C477}"/>
+                </a:ext>
+              </a:extLst>
+            </p:cNvPr>
+            <p:cNvSpPr/>
+            <p:nvPr/>
+          </p:nvSpPr>
+          <p:spPr bwMode="auto">
+            <a:xfrm>
+              <a:off x="5938151" y="4875472"/>
+              <a:ext cx="277382" cy="277382"/>
+            </a:xfrm>
+            <a:prstGeom prst="ellipse">
+              <a:avLst/>
+            </a:prstGeom>
+            <a:solidFill>
+              <a:schemeClr val="accent1"/>
+            </a:solidFill>
+            <a:ln w="28575">
+              <a:solidFill>
+                <a:schemeClr val="bg1"/>
+              </a:solidFill>
+              <a:round/>
+              <a:headEnd/>
+              <a:tailEnd/>
+            </a:ln>
+          </p:spPr>
+          <p:txBody>
+            <a:bodyPr anchor="ctr"/>
+            <a:lstStyle/>
+            <a:p>
+              <a:pPr algn="ctr"/>
+              <a:endParaRPr sz="2400">
+                <a:latin typeface="微软雅黑" panose="020B0503020204020204" pitchFamily="34" charset="-122"/>
+                <a:ea typeface="微软雅黑" panose="020B0503020204020204" pitchFamily="34" charset="-122"/>
+              </a:endParaRPr>
+            </a:p>
+          </p:txBody>
+        </p:sp>
+        <p:cxnSp>
+          <p:nvCxnSpPr>
+            <p:cNvPr id="26" name="Straight Connector 98">
+              <a:extLst>
+                <a:ext uri="{FF2B5EF4-FFF2-40B4-BE49-F238E27FC236}">
+                  <a16:creationId xmlns:a16="http://schemas.microsoft.com/office/drawing/2014/main" id="{5D32AC6A-67D5-4B82-8F11-68DFCBCF1220}"/>
+                </a:ext>
+              </a:extLst>
+            </p:cNvPr>
+            <p:cNvCxnSpPr/>
+            <p:nvPr/>
+          </p:nvCxnSpPr>
+          <p:spPr>
+            <a:xfrm rot="5400000">
+              <a:off x="5910413" y="4694210"/>
+              <a:ext cx="332859" cy="1927"/>
+            </a:xfrm>
+            <a:prstGeom prst="line">
+              <a:avLst/>
+            </a:prstGeom>
+            <a:ln w="28575">
+              <a:solidFill>
+                <a:schemeClr val="accent2"/>
+              </a:solidFill>
+              <a:prstDash val="sysDash"/>
+            </a:ln>
+          </p:spPr>
+          <p:style>
+            <a:lnRef idx="1">
+              <a:schemeClr val="accent1"/>
+            </a:lnRef>
+            <a:fillRef idx="0">
+              <a:schemeClr val="accent1"/>
+            </a:fillRef>
+            <a:effectRef idx="0">
+              <a:schemeClr val="accent1"/>
+            </a:effectRef>
+            <a:fontRef idx="minor">
+              <a:schemeClr val="tx1"/>
+            </a:fontRef>
+          </p:style>
+        </p:cxnSp>
+        <p:cxnSp>
+          <p:nvCxnSpPr>
+            <p:cNvPr id="28" name="Straight Connector 101">
+              <a:extLst>
+                <a:ext uri="{FF2B5EF4-FFF2-40B4-BE49-F238E27FC236}">
+                  <a16:creationId xmlns:a16="http://schemas.microsoft.com/office/drawing/2014/main" id="{75E64DEB-2AFC-45BA-8087-DD028F15B57D}"/>
+                </a:ext>
+              </a:extLst>
+            </p:cNvPr>
+            <p:cNvCxnSpPr/>
+            <p:nvPr/>
+          </p:nvCxnSpPr>
+          <p:spPr>
+            <a:xfrm rot="5400000">
+              <a:off x="5910413" y="4058542"/>
+              <a:ext cx="332859" cy="1927"/>
+            </a:xfrm>
+            <a:prstGeom prst="line">
+              <a:avLst/>
+            </a:prstGeom>
+            <a:ln w="28575">
+              <a:solidFill>
+                <a:schemeClr val="accent3"/>
+              </a:solidFill>
+              <a:prstDash val="sysDash"/>
+            </a:ln>
+          </p:spPr>
+          <p:style>
+            <a:lnRef idx="1">
+              <a:schemeClr val="accent1"/>
+            </a:lnRef>
+            <a:fillRef idx="0">
+              <a:schemeClr val="accent1"/>
+            </a:fillRef>
+            <a:effectRef idx="0">
+              <a:schemeClr val="accent1"/>
+            </a:effectRef>
+            <a:fontRef idx="minor">
+              <a:schemeClr val="tx1"/>
+            </a:fontRef>
+          </p:style>
+        </p:cxnSp>
+        <p:sp>
+          <p:nvSpPr>
+            <p:cNvPr id="29" name="ïsḻíḍe">
+              <a:extLst>
+                <a:ext uri="{FF2B5EF4-FFF2-40B4-BE49-F238E27FC236}">
+                  <a16:creationId xmlns:a16="http://schemas.microsoft.com/office/drawing/2014/main" id="{9F592956-0C4C-40F7-B3A9-4C1DF44699F8}"/>
+                </a:ext>
+              </a:extLst>
+            </p:cNvPr>
+            <p:cNvSpPr/>
+            <p:nvPr/>
+          </p:nvSpPr>
+          <p:spPr bwMode="auto">
+            <a:xfrm>
+              <a:off x="5938151" y="3604136"/>
+              <a:ext cx="277382" cy="277382"/>
+            </a:xfrm>
+            <a:prstGeom prst="ellipse">
+              <a:avLst/>
+            </a:prstGeom>
+            <a:solidFill>
+              <a:schemeClr val="accent3"/>
+            </a:solidFill>
+            <a:ln w="28575">
+              <a:solidFill>
+                <a:schemeClr val="bg1"/>
+              </a:solidFill>
+              <a:round/>
+              <a:headEnd/>
+              <a:tailEnd/>
+            </a:ln>
+          </p:spPr>
+          <p:txBody>
+            <a:bodyPr anchor="ctr"/>
+            <a:lstStyle/>
+            <a:p>
+              <a:pPr algn="ctr"/>
+              <a:endParaRPr sz="2400">
+                <a:latin typeface="微软雅黑" panose="020B0503020204020204" pitchFamily="34" charset="-122"/>
+                <a:ea typeface="微软雅黑" panose="020B0503020204020204" pitchFamily="34" charset="-122"/>
+              </a:endParaRPr>
+            </a:p>
+          </p:txBody>
+        </p:sp>
+        <p:cxnSp>
+          <p:nvCxnSpPr>
+            <p:cNvPr id="31" name="Straight Connector 106">
+              <a:extLst>
+                <a:ext uri="{FF2B5EF4-FFF2-40B4-BE49-F238E27FC236}">
+                  <a16:creationId xmlns:a16="http://schemas.microsoft.com/office/drawing/2014/main" id="{8F7B5AD6-CDE7-426C-91AA-17E0B276EB4A}"/>
+                </a:ext>
+              </a:extLst>
+            </p:cNvPr>
+            <p:cNvCxnSpPr/>
+            <p:nvPr/>
+          </p:nvCxnSpPr>
+          <p:spPr>
+            <a:xfrm rot="5400000">
+              <a:off x="5910413" y="3422874"/>
+              <a:ext cx="332859" cy="1927"/>
+            </a:xfrm>
+            <a:prstGeom prst="line">
+              <a:avLst/>
+            </a:prstGeom>
+            <a:ln w="28575">
+              <a:solidFill>
+                <a:schemeClr val="accent4"/>
+              </a:solidFill>
+              <a:prstDash val="sysDash"/>
+            </a:ln>
+          </p:spPr>
+          <p:style>
+            <a:lnRef idx="1">
+              <a:schemeClr val="accent1"/>
+            </a:lnRef>
+            <a:fillRef idx="0">
+              <a:schemeClr val="accent1"/>
+            </a:fillRef>
+            <a:effectRef idx="0">
+              <a:schemeClr val="accent1"/>
+            </a:effectRef>
+            <a:fontRef idx="minor">
+              <a:schemeClr val="tx1"/>
+            </a:fontRef>
+          </p:style>
+        </p:cxnSp>
+        <p:cxnSp>
+          <p:nvCxnSpPr>
+            <p:cNvPr id="34" name="Straight Connector 111">
+              <a:extLst>
+                <a:ext uri="{FF2B5EF4-FFF2-40B4-BE49-F238E27FC236}">
+                  <a16:creationId xmlns:a16="http://schemas.microsoft.com/office/drawing/2014/main" id="{B80599C0-6355-4A60-A862-693B7089E4EF}"/>
+                </a:ext>
+              </a:extLst>
+            </p:cNvPr>
+            <p:cNvCxnSpPr/>
+            <p:nvPr/>
+          </p:nvCxnSpPr>
+          <p:spPr>
+            <a:xfrm rot="5400000">
+              <a:off x="5910413" y="2787205"/>
+              <a:ext cx="332859" cy="1927"/>
+            </a:xfrm>
+            <a:prstGeom prst="line">
+              <a:avLst/>
+            </a:prstGeom>
+            <a:ln w="28575">
+              <a:solidFill>
+                <a:schemeClr val="accent5"/>
+              </a:solidFill>
+              <a:prstDash val="sysDash"/>
+            </a:ln>
+          </p:spPr>
+          <p:style>
+            <a:lnRef idx="1">
+              <a:schemeClr val="accent1"/>
+            </a:lnRef>
+            <a:fillRef idx="0">
+              <a:schemeClr val="accent1"/>
+            </a:fillRef>
+            <a:effectRef idx="0">
+              <a:schemeClr val="accent1"/>
+            </a:effectRef>
+            <a:fontRef idx="minor">
+              <a:schemeClr val="tx1"/>
+            </a:fontRef>
+          </p:style>
+        </p:cxnSp>
+        <p:sp>
+          <p:nvSpPr>
+            <p:cNvPr id="35" name="í$ļïḓe">
+              <a:extLst>
+                <a:ext uri="{FF2B5EF4-FFF2-40B4-BE49-F238E27FC236}">
+                  <a16:creationId xmlns:a16="http://schemas.microsoft.com/office/drawing/2014/main" id="{EEEA89C8-C9F8-4496-A798-AB774C16C926}"/>
+                </a:ext>
+              </a:extLst>
+            </p:cNvPr>
+            <p:cNvSpPr/>
+            <p:nvPr/>
+          </p:nvSpPr>
+          <p:spPr bwMode="auto">
+            <a:xfrm>
+              <a:off x="5938151" y="2332799"/>
+              <a:ext cx="277382" cy="277382"/>
+            </a:xfrm>
+            <a:prstGeom prst="ellipse">
+              <a:avLst/>
+            </a:prstGeom>
+            <a:solidFill>
+              <a:schemeClr val="accent5"/>
+            </a:solidFill>
+            <a:ln w="28575">
+              <a:solidFill>
+                <a:schemeClr val="bg1"/>
+              </a:solidFill>
+              <a:round/>
+              <a:headEnd/>
+              <a:tailEnd/>
+            </a:ln>
+          </p:spPr>
+          <p:txBody>
+            <a:bodyPr anchor="ctr"/>
+            <a:lstStyle/>
+            <a:p>
+              <a:pPr algn="ctr"/>
+              <a:endParaRPr sz="2400">
+                <a:latin typeface="微软雅黑" panose="020B0503020204020204" pitchFamily="34" charset="-122"/>
+                <a:ea typeface="微软雅黑" panose="020B0503020204020204" pitchFamily="34" charset="-122"/>
+              </a:endParaRPr>
+            </a:p>
+          </p:txBody>
+        </p:sp>
+        <p:cxnSp>
+          <p:nvCxnSpPr>
+            <p:cNvPr id="37" name="Straight Connector 116">
+              <a:extLst>
+                <a:ext uri="{FF2B5EF4-FFF2-40B4-BE49-F238E27FC236}">
+                  <a16:creationId xmlns:a16="http://schemas.microsoft.com/office/drawing/2014/main" id="{6B8D1BEE-ABF1-4C6B-BEFE-ABD7F8E0BA4E}"/>
+                </a:ext>
+              </a:extLst>
+            </p:cNvPr>
+            <p:cNvCxnSpPr/>
+            <p:nvPr/>
+          </p:nvCxnSpPr>
+          <p:spPr>
+            <a:xfrm rot="5400000">
+              <a:off x="5910413" y="2151537"/>
+              <a:ext cx="332859" cy="1927"/>
+            </a:xfrm>
+            <a:prstGeom prst="line">
+              <a:avLst/>
+            </a:prstGeom>
+            <a:ln w="28575">
+              <a:solidFill>
+                <a:schemeClr val="accent6"/>
+              </a:solidFill>
+              <a:prstDash val="sysDash"/>
+            </a:ln>
+          </p:spPr>
+          <p:style>
+            <a:lnRef idx="1">
+              <a:schemeClr val="accent1"/>
+            </a:lnRef>
+            <a:fillRef idx="0">
+              <a:schemeClr val="accent1"/>
+            </a:fillRef>
+            <a:effectRef idx="0">
+              <a:schemeClr val="accent1"/>
+            </a:effectRef>
+            <a:fontRef idx="minor">
+              <a:schemeClr val="tx1"/>
+            </a:fontRef>
+          </p:style>
+        </p:cxnSp>
+      </p:grpSp>
       <p:sp>
         <p:nvSpPr>
           <p:cNvPr id="66" name="标题 1">
@@ -13018,429 +14933,65 @@
                 <a:latin typeface="微软雅黑" panose="020B0503020204020204" pitchFamily="34" charset="-122"/>
                 <a:ea typeface="微软雅黑" panose="020B0503020204020204" pitchFamily="34" charset="-122"/>
               </a:rPr>
-              <a:t>需要哪些硬件？</a:t>
+              <a:t>活动目标</a:t>
             </a:r>
           </a:p>
         </p:txBody>
       </p:sp>
       <p:sp>
         <p:nvSpPr>
-          <p:cNvPr id="4" name="矩形 3">
+          <p:cNvPr id="52" name="işļíḍê">
             <a:extLst>
               <a:ext uri="{FF2B5EF4-FFF2-40B4-BE49-F238E27FC236}">
-                <a16:creationId xmlns:a16="http://schemas.microsoft.com/office/drawing/2014/main" id="{E8EA1602-372F-46B0-A3A0-3A00C35C5314}"/>
+                <a16:creationId xmlns:a16="http://schemas.microsoft.com/office/drawing/2014/main" id="{0A538647-03BC-4C04-AFB4-40120E6C05C6}"/>
               </a:ext>
             </a:extLst>
           </p:cNvPr>
-          <p:cNvSpPr/>
+          <p:cNvSpPr txBox="1">
+            <a:spLocks/>
+          </p:cNvSpPr>
           <p:nvPr/>
         </p:nvSpPr>
-        <p:spPr>
+        <p:spPr bwMode="auto">
           <a:xfrm>
-            <a:off x="803959" y="1061654"/>
-            <a:ext cx="9321117" cy="967957"/>
+            <a:off x="3747193" y="4496864"/>
+            <a:ext cx="3253152" cy="1047665"/>
           </a:xfrm>
           <a:prstGeom prst="rect">
             <a:avLst/>
           </a:prstGeom>
+          <a:noFill/>
         </p:spPr>
         <p:txBody>
-          <a:bodyPr wrap="square">
-            <a:spAutoFit/>
+          <a:bodyPr wrap="none" lIns="432000" tIns="0" rIns="360000" bIns="0" anchor="ctr" anchorCtr="0">
+            <a:normAutofit/>
           </a:bodyPr>
           <a:lstStyle/>
           <a:p>
-            <a:pPr marL="285750" indent="-285750">
-              <a:lnSpc>
-                <a:spcPct val="150000"/>
-              </a:lnSpc>
-              <a:buFont typeface="Wingdings" panose="05000000000000000000" pitchFamily="2" charset="2"/>
-              <a:buChar char="n"/>
-            </a:pPr>
             <a:r>
-              <a:rPr lang="zh-CN" altLang="en-US" sz="2000" b="1" dirty="0">
+              <a:rPr lang="zh-CN" altLang="en-US" b="1" dirty="0">
                 <a:solidFill>
-                  <a:srgbClr val="EEAF34"/>
+                  <a:schemeClr val="bg1"/>
                 </a:solidFill>
+                <a:latin typeface="微软雅黑" panose="020B0503020204020204" pitchFamily="34" charset="-122"/>
+                <a:ea typeface="微软雅黑" panose="020B0503020204020204" pitchFamily="34" charset="-122"/>
               </a:rPr>
-              <a:t>目标：为小白实现视觉模块。</a:t>
+              <a:t>了解简单的函数语句编写</a:t>
             </a:r>
-            <a:endParaRPr lang="en-US" altLang="zh-CN" sz="2000" b="1" dirty="0">
+            <a:endParaRPr lang="zh-CN" altLang="en-US" b="1" dirty="0">
               <a:solidFill>
-                <a:srgbClr val="EEAF34"/>
+                <a:srgbClr val="FFFF00"/>
               </a:solidFill>
-            </a:endParaRPr>
-          </a:p>
-          <a:p>
-            <a:pPr marL="285750" indent="-285750">
-              <a:lnSpc>
-                <a:spcPct val="150000"/>
-              </a:lnSpc>
-              <a:buFont typeface="Wingdings" panose="05000000000000000000" pitchFamily="2" charset="2"/>
-              <a:buChar char="n"/>
-            </a:pPr>
-            <a:r>
-              <a:rPr lang="zh-CN" altLang="en-US" sz="2000" b="1" dirty="0">
-                <a:solidFill>
-                  <a:srgbClr val="1165A0"/>
-                </a:solidFill>
-              </a:rPr>
-              <a:t>请同学们检查一下手里的材料是否齐全？</a:t>
-            </a:r>
-            <a:endParaRPr lang="en-US" altLang="zh-CN" sz="2000" b="1" dirty="0">
-              <a:solidFill>
-                <a:srgbClr val="1165A0"/>
-              </a:solidFill>
+              <a:latin typeface="微软雅黑" panose="020B0503020204020204" pitchFamily="34" charset="-122"/>
+              <a:ea typeface="微软雅黑" panose="020B0503020204020204" pitchFamily="34" charset="-122"/>
             </a:endParaRPr>
           </a:p>
         </p:txBody>
       </p:sp>
-      <p:sp>
-        <p:nvSpPr>
-          <p:cNvPr id="5" name="等腰三角形 4">
-            <a:extLst>
-              <a:ext uri="{FF2B5EF4-FFF2-40B4-BE49-F238E27FC236}">
-                <a16:creationId xmlns:a16="http://schemas.microsoft.com/office/drawing/2014/main" id="{4BC54AA8-0A19-4174-B334-9AC3C3D51C4E}"/>
-              </a:ext>
-            </a:extLst>
-          </p:cNvPr>
-          <p:cNvSpPr/>
-          <p:nvPr/>
-        </p:nvSpPr>
-        <p:spPr>
-          <a:xfrm>
-            <a:off x="8665547" y="2862704"/>
-            <a:ext cx="321399" cy="321399"/>
-          </a:xfrm>
-          <a:prstGeom prst="triangle">
-            <a:avLst>
-              <a:gd name="adj" fmla="val 100000"/>
-            </a:avLst>
-          </a:prstGeom>
-          <a:solidFill>
-            <a:schemeClr val="accent3"/>
-          </a:solidFill>
-          <a:ln>
-            <a:noFill/>
-          </a:ln>
-        </p:spPr>
-        <p:style>
-          <a:lnRef idx="2">
-            <a:scrgbClr r="0" g="0" b="0"/>
-          </a:lnRef>
-          <a:fillRef idx="1">
-            <a:scrgbClr r="0" g="0" b="0"/>
-          </a:fillRef>
-          <a:effectRef idx="0">
-            <a:schemeClr val="accent2">
-              <a:hueOff val="0"/>
-              <a:satOff val="0"/>
-              <a:lumOff val="0"/>
-              <a:alphaOff val="0"/>
-            </a:schemeClr>
-          </a:effectRef>
-          <a:fontRef idx="minor">
-            <a:schemeClr val="lt1"/>
-          </a:fontRef>
-        </p:style>
-      </p:sp>
-      <p:sp>
-        <p:nvSpPr>
-          <p:cNvPr id="6" name="L 形 5">
-            <a:extLst>
-              <a:ext uri="{FF2B5EF4-FFF2-40B4-BE49-F238E27FC236}">
-                <a16:creationId xmlns:a16="http://schemas.microsoft.com/office/drawing/2014/main" id="{22AE386B-522C-48D2-950C-91FB967AA305}"/>
-              </a:ext>
-            </a:extLst>
-          </p:cNvPr>
-          <p:cNvSpPr/>
-          <p:nvPr/>
-        </p:nvSpPr>
-        <p:spPr>
-          <a:xfrm rot="5400000">
-            <a:off x="9558121" y="2485600"/>
-            <a:ext cx="1133910" cy="1886801"/>
-          </a:xfrm>
-          <a:prstGeom prst="corner">
-            <a:avLst>
-              <a:gd name="adj1" fmla="val 16120"/>
-              <a:gd name="adj2" fmla="val 16110"/>
-            </a:avLst>
-          </a:prstGeom>
-          <a:ln>
-            <a:noFill/>
-          </a:ln>
-        </p:spPr>
-        <p:style>
-          <a:lnRef idx="2">
-            <a:scrgbClr r="0" g="0" b="0"/>
-          </a:lnRef>
-          <a:fillRef idx="1">
-            <a:schemeClr val="accent3">
-              <a:hueOff val="0"/>
-              <a:satOff val="0"/>
-              <a:lumOff val="0"/>
-              <a:alphaOff val="0"/>
-            </a:schemeClr>
-          </a:fillRef>
-          <a:effectRef idx="0">
-            <a:schemeClr val="accent3">
-              <a:hueOff val="0"/>
-              <a:satOff val="0"/>
-              <a:lumOff val="0"/>
-              <a:alphaOff val="0"/>
-            </a:schemeClr>
-          </a:effectRef>
-          <a:fontRef idx="minor">
-            <a:schemeClr val="lt1"/>
-          </a:fontRef>
-        </p:style>
-      </p:sp>
-      <p:grpSp>
-        <p:nvGrpSpPr>
-          <p:cNvPr id="7" name="组合 6">
-            <a:extLst>
-              <a:ext uri="{FF2B5EF4-FFF2-40B4-BE49-F238E27FC236}">
-                <a16:creationId xmlns:a16="http://schemas.microsoft.com/office/drawing/2014/main" id="{AEB6080E-76FE-42FB-9B3A-D554A9CA8E41}"/>
-              </a:ext>
-            </a:extLst>
-          </p:cNvPr>
-          <p:cNvGrpSpPr/>
-          <p:nvPr/>
-        </p:nvGrpSpPr>
-        <p:grpSpPr>
-          <a:xfrm>
-            <a:off x="9368844" y="3049347"/>
-            <a:ext cx="1703415" cy="1493143"/>
-            <a:chOff x="6446614" y="837408"/>
-            <a:chExt cx="1703415" cy="1493143"/>
-          </a:xfrm>
-        </p:grpSpPr>
-        <p:sp>
-          <p:nvSpPr>
-            <p:cNvPr id="8" name="矩形 7">
-              <a:extLst>
-                <a:ext uri="{FF2B5EF4-FFF2-40B4-BE49-F238E27FC236}">
-                  <a16:creationId xmlns:a16="http://schemas.microsoft.com/office/drawing/2014/main" id="{8C6B704A-0377-4ED2-846C-3C437BACFEDC}"/>
-                </a:ext>
-              </a:extLst>
-            </p:cNvPr>
-            <p:cNvSpPr/>
-            <p:nvPr/>
-          </p:nvSpPr>
-          <p:spPr>
-            <a:xfrm>
-              <a:off x="6446614" y="837408"/>
-              <a:ext cx="1703415" cy="1493143"/>
-            </a:xfrm>
-            <a:prstGeom prst="rect">
-              <a:avLst/>
-            </a:prstGeom>
-          </p:spPr>
-          <p:style>
-            <a:lnRef idx="0">
-              <a:schemeClr val="dk1">
-                <a:alpha val="0"/>
-                <a:hueOff val="0"/>
-                <a:satOff val="0"/>
-                <a:lumOff val="0"/>
-                <a:alphaOff val="0"/>
-              </a:schemeClr>
-            </a:lnRef>
-            <a:fillRef idx="0">
-              <a:schemeClr val="lt1">
-                <a:alpha val="0"/>
-                <a:hueOff val="0"/>
-                <a:satOff val="0"/>
-                <a:lumOff val="0"/>
-                <a:alphaOff val="0"/>
-              </a:schemeClr>
-            </a:fillRef>
-            <a:effectRef idx="0">
-              <a:schemeClr val="lt1">
-                <a:alpha val="0"/>
-                <a:hueOff val="0"/>
-                <a:satOff val="0"/>
-                <a:lumOff val="0"/>
-                <a:alphaOff val="0"/>
-              </a:schemeClr>
-            </a:effectRef>
-            <a:fontRef idx="minor">
-              <a:schemeClr val="tx1">
-                <a:hueOff val="0"/>
-                <a:satOff val="0"/>
-                <a:lumOff val="0"/>
-                <a:alphaOff val="0"/>
-              </a:schemeClr>
-            </a:fontRef>
-          </p:style>
-        </p:sp>
-        <p:sp>
-          <p:nvSpPr>
-            <p:cNvPr id="9" name="文本框 8">
-              <a:extLst>
-                <a:ext uri="{FF2B5EF4-FFF2-40B4-BE49-F238E27FC236}">
-                  <a16:creationId xmlns:a16="http://schemas.microsoft.com/office/drawing/2014/main" id="{92D3E994-22FC-4732-9C59-CD388E88FC67}"/>
-                </a:ext>
-              </a:extLst>
-            </p:cNvPr>
-            <p:cNvSpPr txBox="1"/>
-            <p:nvPr/>
-          </p:nvSpPr>
-          <p:spPr>
-            <a:xfrm>
-              <a:off x="6446614" y="837408"/>
-              <a:ext cx="1703415" cy="1493143"/>
-            </a:xfrm>
-            <a:prstGeom prst="rect">
-              <a:avLst/>
-            </a:prstGeom>
-          </p:spPr>
-          <p:style>
-            <a:lnRef idx="0">
-              <a:scrgbClr r="0" g="0" b="0"/>
-            </a:lnRef>
-            <a:fillRef idx="0">
-              <a:scrgbClr r="0" g="0" b="0"/>
-            </a:fillRef>
-            <a:effectRef idx="0">
-              <a:scrgbClr r="0" g="0" b="0"/>
-            </a:effectRef>
-            <a:fontRef idx="minor">
-              <a:schemeClr val="tx1">
-                <a:hueOff val="0"/>
-                <a:satOff val="0"/>
-                <a:lumOff val="0"/>
-                <a:alphaOff val="0"/>
-              </a:schemeClr>
-            </a:fontRef>
-          </p:style>
-          <p:txBody>
-            <a:bodyPr spcFirstLastPara="0" vert="horz" wrap="square" lIns="182880" tIns="182880" rIns="0" bIns="68580" numCol="1" spcCol="1270" anchor="t" anchorCtr="0">
-              <a:noAutofit/>
-            </a:bodyPr>
-            <a:lstStyle/>
-            <a:p>
-              <a:pPr lvl="0" defTabSz="800100">
-                <a:lnSpc>
-                  <a:spcPct val="90000"/>
-                </a:lnSpc>
-                <a:spcBef>
-                  <a:spcPct val="0"/>
-                </a:spcBef>
-                <a:spcAft>
-                  <a:spcPct val="35000"/>
-                </a:spcAft>
-              </a:pPr>
-              <a:r>
-                <a:rPr lang="zh-CN" altLang="en-US" b="1" dirty="0">
-                  <a:latin typeface="微软雅黑" panose="020B0503020204020204" pitchFamily="34" charset="-122"/>
-                  <a:ea typeface="微软雅黑" panose="020B0503020204020204" pitchFamily="34" charset="-122"/>
-                </a:rPr>
-                <a:t>热熔胶枪</a:t>
-              </a:r>
-              <a:endParaRPr lang="en-US" sz="1800" b="1" kern="1200" dirty="0">
-                <a:latin typeface="微软雅黑" panose="020B0503020204020204" pitchFamily="34" charset="-122"/>
-                <a:ea typeface="微软雅黑" panose="020B0503020204020204" pitchFamily="34" charset="-122"/>
-              </a:endParaRPr>
-            </a:p>
-          </p:txBody>
-        </p:sp>
-      </p:grpSp>
-      <p:pic>
-        <p:nvPicPr>
-          <p:cNvPr id="12" name="图片 11">
-            <a:extLst>
-              <a:ext uri="{FF2B5EF4-FFF2-40B4-BE49-F238E27FC236}">
-                <a16:creationId xmlns:a16="http://schemas.microsoft.com/office/drawing/2014/main" id="{61F691A3-FD7F-4373-B7EB-30A6D1D59209}"/>
-              </a:ext>
-            </a:extLst>
-          </p:cNvPr>
-          <p:cNvPicPr>
-            <a:picLocks noChangeAspect="1"/>
-          </p:cNvPicPr>
-          <p:nvPr/>
-        </p:nvPicPr>
-        <p:blipFill>
-          <a:blip r:embed="rId9"/>
-          <a:stretch>
-            <a:fillRect/>
-          </a:stretch>
-        </p:blipFill>
-        <p:spPr>
-          <a:xfrm>
-            <a:off x="5284381" y="4980708"/>
-            <a:ext cx="1762034" cy="1741604"/>
-          </a:xfrm>
-          <a:prstGeom prst="rect">
-            <a:avLst/>
-          </a:prstGeom>
-        </p:spPr>
-      </p:pic>
-      <p:pic>
-        <p:nvPicPr>
-          <p:cNvPr id="2" name="图片 1">
-            <a:extLst>
-              <a:ext uri="{FF2B5EF4-FFF2-40B4-BE49-F238E27FC236}">
-                <a16:creationId xmlns:a16="http://schemas.microsoft.com/office/drawing/2014/main" id="{C1E8FEDF-9800-447C-85AD-E7E71916AA86}"/>
-              </a:ext>
-            </a:extLst>
-          </p:cNvPr>
-          <p:cNvPicPr>
-            <a:picLocks noChangeAspect="1"/>
-          </p:cNvPicPr>
-          <p:nvPr/>
-        </p:nvPicPr>
-        <p:blipFill>
-          <a:blip r:embed="rId10"/>
-          <a:stretch>
-            <a:fillRect/>
-          </a:stretch>
-        </p:blipFill>
-        <p:spPr>
-          <a:xfrm>
-            <a:off x="9513967" y="3636660"/>
-            <a:ext cx="1749239" cy="1498685"/>
-          </a:xfrm>
-          <a:prstGeom prst="rect">
-            <a:avLst/>
-          </a:prstGeom>
-        </p:spPr>
-      </p:pic>
-      <p:pic>
-        <p:nvPicPr>
-          <p:cNvPr id="3" name="图片 2">
-            <a:extLst>
-              <a:ext uri="{FF2B5EF4-FFF2-40B4-BE49-F238E27FC236}">
-                <a16:creationId xmlns:a16="http://schemas.microsoft.com/office/drawing/2014/main" id="{B4020C9D-52E5-40D4-B732-E64D190F7C8E}"/>
-              </a:ext>
-            </a:extLst>
-          </p:cNvPr>
-          <p:cNvPicPr>
-            <a:picLocks noChangeAspect="1"/>
-          </p:cNvPicPr>
-          <p:nvPr/>
-        </p:nvPicPr>
-        <p:blipFill>
-          <a:blip r:embed="rId11"/>
-          <a:stretch>
-            <a:fillRect/>
-          </a:stretch>
-        </p:blipFill>
-        <p:spPr>
-          <a:xfrm>
-            <a:off x="7276272" y="4300949"/>
-            <a:ext cx="1776697" cy="1359517"/>
-          </a:xfrm>
-          <a:prstGeom prst="rect">
-            <a:avLst/>
-          </a:prstGeom>
-        </p:spPr>
-      </p:pic>
     </p:spTree>
     <p:extLst>
       <p:ext uri="{BB962C8B-B14F-4D97-AF65-F5344CB8AC3E}">
-        <p14:creationId xmlns:p14="http://schemas.microsoft.com/office/powerpoint/2010/main" val="2201758554"/>
+        <p14:creationId xmlns:p14="http://schemas.microsoft.com/office/powerpoint/2010/main" val="569281318"/>
       </p:ext>
     </p:extLst>
   </p:cSld>

</xml_diff>